<commit_message>
added which tasks are done
</commit_message>
<xml_diff>
--- a/P2/P2-Power Point.pptx
+++ b/P2/P2-Power Point.pptx
@@ -3,32 +3,32 @@
 <p:presentation xmlns:a="http://schemas.openxmlformats.org/drawingml/2006/main" xmlns:r="http://schemas.openxmlformats.org/officeDocument/2006/relationships" xmlns:p="http://schemas.openxmlformats.org/presentationml/2006/main">
   <p:sldMasterIdLst>
     <p:sldMasterId id="2147483648" r:id="rId1"/>
-    <p:sldMasterId id="2147483663" r:id="rId3"/>
+    <p:sldMasterId id="2147483663" r:id="rId2"/>
   </p:sldMasterIdLst>
   <p:handoutMasterIdLst>
-    <p:handoutMasterId r:id="rId24"/>
+    <p:handoutMasterId r:id="rId23"/>
   </p:handoutMasterIdLst>
   <p:sldIdLst>
-    <p:sldId id="256" r:id="rId4"/>
-    <p:sldId id="259" r:id="rId5"/>
-    <p:sldId id="289" r:id="rId6"/>
-    <p:sldId id="265" r:id="rId7"/>
-    <p:sldId id="306" r:id="rId8"/>
-    <p:sldId id="331" r:id="rId9"/>
-    <p:sldId id="366" r:id="rId10"/>
-    <p:sldId id="332" r:id="rId11"/>
-    <p:sldId id="365" r:id="rId12"/>
-    <p:sldId id="290" r:id="rId13"/>
-    <p:sldId id="307" r:id="rId14"/>
-    <p:sldId id="355" r:id="rId15"/>
-    <p:sldId id="311" r:id="rId16"/>
-    <p:sldId id="358" r:id="rId17"/>
-    <p:sldId id="348" r:id="rId18"/>
-    <p:sldId id="314" r:id="rId19"/>
-    <p:sldId id="315" r:id="rId20"/>
-    <p:sldId id="356" r:id="rId21"/>
-    <p:sldId id="359" r:id="rId22"/>
-    <p:sldId id="294" r:id="rId23"/>
+    <p:sldId id="256" r:id="rId3"/>
+    <p:sldId id="259" r:id="rId4"/>
+    <p:sldId id="289" r:id="rId5"/>
+    <p:sldId id="265" r:id="rId6"/>
+    <p:sldId id="306" r:id="rId7"/>
+    <p:sldId id="331" r:id="rId8"/>
+    <p:sldId id="366" r:id="rId9"/>
+    <p:sldId id="332" r:id="rId10"/>
+    <p:sldId id="365" r:id="rId11"/>
+    <p:sldId id="290" r:id="rId12"/>
+    <p:sldId id="307" r:id="rId13"/>
+    <p:sldId id="355" r:id="rId14"/>
+    <p:sldId id="311" r:id="rId15"/>
+    <p:sldId id="358" r:id="rId16"/>
+    <p:sldId id="348" r:id="rId17"/>
+    <p:sldId id="314" r:id="rId18"/>
+    <p:sldId id="315" r:id="rId19"/>
+    <p:sldId id="356" r:id="rId20"/>
+    <p:sldId id="359" r:id="rId21"/>
+    <p:sldId id="294" r:id="rId22"/>
   </p:sldIdLst>
   <p:sldSz cx="9144000" cy="5143500" type="screen16x9"/>
   <p:notesSz cx="6858000" cy="9144000"/>
@@ -128,8 +128,30 @@
     </a:lvl9pPr>
   </p:defaultTextStyle>
   <p:extLst>
+    <p:ext uri="{EFAFB233-063F-42B5-8137-9DF3F51BA10A}">
+      <p15:sldGuideLst xmlns:p15="http://schemas.microsoft.com/office/powerpoint/2012/main">
+        <p15:guide id="1" orient="horz" pos="2676">
+          <p15:clr>
+            <a:srgbClr val="A4A3A4"/>
+          </p15:clr>
+        </p15:guide>
+        <p15:guide id="2" pos="1655">
+          <p15:clr>
+            <a:srgbClr val="A4A3A4"/>
+          </p15:clr>
+        </p15:guide>
+        <p15:guide id="3" pos="2880">
+          <p15:clr>
+            <a:srgbClr val="A4A3A4"/>
+          </p15:clr>
+        </p15:guide>
+      </p15:sldGuideLst>
+    </p:ext>
+    <p:ext uri="{2D200454-40CA-4A62-9FC3-DE9A4176ACB9}">
+      <p15:notesGuideLst xmlns:p15="http://schemas.microsoft.com/office/powerpoint/2012/main"/>
+    </p:ext>
     <p:ext uri="{505F2C04-C923-438B-8C0F-E0CD2BADF298}">
-      <wppc:fontMiss xmlns:wppc="http://www.wps.cn/officeDocument/PresentationCustomData" type="true"/>
+      <wppc:fontMiss xmlns:wppc="http://www.wps.cn/officeDocument/PresentationCustomData" xmlns="" type="true"/>
     </p:ext>
   </p:extLst>
 </p:presentation>
@@ -217,6 +239,7 @@
           <a:p>
             <a:fld id="{EB402216-1DD8-4AB3-8BF0-CFB6DFF12492}" type="datetimeFigureOut">
               <a:rPr lang="zh-CN" altLang="en-US" smtClean="0"/>
+              <a:t>2019/11/6</a:t>
             </a:fld>
             <a:endParaRPr lang="zh-CN" altLang="en-US"/>
           </a:p>
@@ -282,6 +305,7 @@
           <a:p>
             <a:fld id="{D1C69EFE-5A9A-4272-A138-4483215D921A}" type="slidenum">
               <a:rPr lang="zh-CN" altLang="en-US" smtClean="0"/>
+              <a:t>‹#›</a:t>
             </a:fld>
             <a:endParaRPr lang="zh-CN" altLang="en-US"/>
           </a:p>
@@ -346,13 +370,13 @@
   <p:clrMapOvr>
     <a:masterClrMapping/>
   </p:clrMapOvr>
-  <mc:AlternateContent xmlns:mc="http://schemas.openxmlformats.org/markup-compatibility/2006">
-    <mc:Choice xmlns:p14="http://schemas.microsoft.com/office/powerpoint/2010/main" Requires="p14">
+  <mc:AlternateContent xmlns:mc="http://schemas.openxmlformats.org/markup-compatibility/2006" xmlns:p14="http://schemas.microsoft.com/office/powerpoint/2010/main">
+    <mc:Choice Requires="p14">
       <p:transition spd="slow" p14:dur="1500">
         <p:random/>
       </p:transition>
     </mc:Choice>
-    <mc:Fallback>
+    <mc:Fallback xmlns="">
       <p:transition spd="slow">
         <p:random/>
       </p:transition>
@@ -395,6 +419,7 @@
           <a:p>
             <a:fld id="{95666703-9F6B-41A9-8273-A226E2EEC7FD}" type="datetimeFigureOut">
               <a:rPr lang="zh-CN" altLang="en-US" smtClean="0"/>
+              <a:t>2019/11/6</a:t>
             </a:fld>
             <a:endParaRPr lang="zh-CN" altLang="en-US"/>
           </a:p>
@@ -436,6 +461,7 @@
           <a:p>
             <a:fld id="{4F9A4CF2-39D5-471D-AEEA-44C9DDC76718}" type="slidenum">
               <a:rPr lang="zh-CN" altLang="en-US" smtClean="0"/>
+              <a:t>‹#›</a:t>
             </a:fld>
             <a:endParaRPr lang="zh-CN" altLang="en-US"/>
           </a:p>
@@ -446,13 +472,13 @@
   <p:clrMapOvr>
     <a:masterClrMapping/>
   </p:clrMapOvr>
-  <mc:AlternateContent xmlns:mc="http://schemas.openxmlformats.org/markup-compatibility/2006">
-    <mc:Choice xmlns:p14="http://schemas.microsoft.com/office/powerpoint/2010/main" Requires="p14">
+  <mc:AlternateContent xmlns:mc="http://schemas.openxmlformats.org/markup-compatibility/2006" xmlns:p14="http://schemas.microsoft.com/office/powerpoint/2010/main">
+    <mc:Choice Requires="p14">
       <p:transition spd="slow" p14:dur="1500">
         <p:random/>
       </p:transition>
     </mc:Choice>
-    <mc:Fallback>
+    <mc:Fallback xmlns="">
       <p:transition spd="slow">
         <p:random/>
       </p:transition>
@@ -563,7 +589,6 @@
               <a:rPr lang="zh-CN" altLang="en-US"/>
               <a:t>编辑母版文本样式</a:t>
             </a:r>
-            <a:endParaRPr lang="zh-CN" altLang="en-US"/>
           </a:p>
           <a:p>
             <a:pPr lvl="1"/>
@@ -571,7 +596,6 @@
               <a:rPr lang="zh-CN" altLang="en-US"/>
               <a:t>第二级</a:t>
             </a:r>
-            <a:endParaRPr lang="zh-CN" altLang="en-US"/>
           </a:p>
           <a:p>
             <a:pPr lvl="2"/>
@@ -579,7 +603,6 @@
               <a:rPr lang="zh-CN" altLang="en-US"/>
               <a:t>第三级</a:t>
             </a:r>
-            <a:endParaRPr lang="zh-CN" altLang="en-US"/>
           </a:p>
           <a:p>
             <a:pPr lvl="3"/>
@@ -587,7 +610,6 @@
               <a:rPr lang="zh-CN" altLang="en-US"/>
               <a:t>第四级</a:t>
             </a:r>
-            <a:endParaRPr lang="zh-CN" altLang="en-US"/>
           </a:p>
           <a:p>
             <a:pPr lvl="4"/>
@@ -661,7 +683,6 @@
               <a:rPr lang="zh-CN" altLang="en-US"/>
               <a:t>编辑母版文本样式</a:t>
             </a:r>
-            <a:endParaRPr lang="zh-CN" altLang="en-US"/>
           </a:p>
         </p:txBody>
       </p:sp>
@@ -682,6 +703,7 @@
           <a:p>
             <a:fld id="{95666703-9F6B-41A9-8273-A226E2EEC7FD}" type="datetimeFigureOut">
               <a:rPr lang="zh-CN" altLang="en-US" smtClean="0"/>
+              <a:t>2019/11/6</a:t>
             </a:fld>
             <a:endParaRPr lang="zh-CN" altLang="en-US"/>
           </a:p>
@@ -723,6 +745,7 @@
           <a:p>
             <a:fld id="{4F9A4CF2-39D5-471D-AEEA-44C9DDC76718}" type="slidenum">
               <a:rPr lang="zh-CN" altLang="en-US" smtClean="0"/>
+              <a:t>‹#›</a:t>
             </a:fld>
             <a:endParaRPr lang="zh-CN" altLang="en-US"/>
           </a:p>
@@ -733,13 +756,13 @@
   <p:clrMapOvr>
     <a:masterClrMapping/>
   </p:clrMapOvr>
-  <mc:AlternateContent xmlns:mc="http://schemas.openxmlformats.org/markup-compatibility/2006">
-    <mc:Choice xmlns:p14="http://schemas.microsoft.com/office/powerpoint/2010/main" Requires="p14">
+  <mc:AlternateContent xmlns:mc="http://schemas.openxmlformats.org/markup-compatibility/2006" xmlns:p14="http://schemas.microsoft.com/office/powerpoint/2010/main">
+    <mc:Choice Requires="p14">
       <p:transition spd="slow" p14:dur="1500">
         <p:random/>
       </p:transition>
     </mc:Choice>
-    <mc:Fallback>
+    <mc:Fallback xmlns="">
       <p:transition spd="slow">
         <p:random/>
       </p:transition>
@@ -924,7 +947,6 @@
               <a:rPr lang="zh-CN" altLang="en-US"/>
               <a:t>编辑母版文本样式</a:t>
             </a:r>
-            <a:endParaRPr lang="zh-CN" altLang="en-US"/>
           </a:p>
         </p:txBody>
       </p:sp>
@@ -945,6 +967,7 @@
           <a:p>
             <a:fld id="{95666703-9F6B-41A9-8273-A226E2EEC7FD}" type="datetimeFigureOut">
               <a:rPr lang="zh-CN" altLang="en-US" smtClean="0"/>
+              <a:t>2019/11/6</a:t>
             </a:fld>
             <a:endParaRPr lang="zh-CN" altLang="en-US"/>
           </a:p>
@@ -986,6 +1009,7 @@
           <a:p>
             <a:fld id="{4F9A4CF2-39D5-471D-AEEA-44C9DDC76718}" type="slidenum">
               <a:rPr lang="zh-CN" altLang="en-US" smtClean="0"/>
+              <a:t>‹#›</a:t>
             </a:fld>
             <a:endParaRPr lang="zh-CN" altLang="en-US"/>
           </a:p>
@@ -996,13 +1020,13 @@
   <p:clrMapOvr>
     <a:masterClrMapping/>
   </p:clrMapOvr>
-  <mc:AlternateContent xmlns:mc="http://schemas.openxmlformats.org/markup-compatibility/2006">
-    <mc:Choice xmlns:p14="http://schemas.microsoft.com/office/powerpoint/2010/main" Requires="p14">
+  <mc:AlternateContent xmlns:mc="http://schemas.openxmlformats.org/markup-compatibility/2006" xmlns:p14="http://schemas.microsoft.com/office/powerpoint/2010/main">
+    <mc:Choice Requires="p14">
       <p:transition spd="slow" p14:dur="1500">
         <p:random/>
       </p:transition>
     </mc:Choice>
-    <mc:Fallback>
+    <mc:Fallback xmlns="">
       <p:transition spd="slow">
         <p:random/>
       </p:transition>
@@ -1071,7 +1095,6 @@
               <a:rPr lang="zh-CN" altLang="en-US"/>
               <a:t>编辑母版文本样式</a:t>
             </a:r>
-            <a:endParaRPr lang="zh-CN" altLang="en-US"/>
           </a:p>
           <a:p>
             <a:pPr lvl="1"/>
@@ -1079,7 +1102,6 @@
               <a:rPr lang="zh-CN" altLang="en-US"/>
               <a:t>第二级</a:t>
             </a:r>
-            <a:endParaRPr lang="zh-CN" altLang="en-US"/>
           </a:p>
           <a:p>
             <a:pPr lvl="2"/>
@@ -1087,7 +1109,6 @@
               <a:rPr lang="zh-CN" altLang="en-US"/>
               <a:t>第三级</a:t>
             </a:r>
-            <a:endParaRPr lang="zh-CN" altLang="en-US"/>
           </a:p>
           <a:p>
             <a:pPr lvl="3"/>
@@ -1095,7 +1116,6 @@
               <a:rPr lang="zh-CN" altLang="en-US"/>
               <a:t>第四级</a:t>
             </a:r>
-            <a:endParaRPr lang="zh-CN" altLang="en-US"/>
           </a:p>
           <a:p>
             <a:pPr lvl="4"/>
@@ -1124,6 +1144,7 @@
           <a:p>
             <a:fld id="{95666703-9F6B-41A9-8273-A226E2EEC7FD}" type="datetimeFigureOut">
               <a:rPr lang="zh-CN" altLang="en-US" smtClean="0"/>
+              <a:t>2019/11/6</a:t>
             </a:fld>
             <a:endParaRPr lang="zh-CN" altLang="en-US"/>
           </a:p>
@@ -1165,6 +1186,7 @@
           <a:p>
             <a:fld id="{4F9A4CF2-39D5-471D-AEEA-44C9DDC76718}" type="slidenum">
               <a:rPr lang="zh-CN" altLang="en-US" smtClean="0"/>
+              <a:t>‹#›</a:t>
             </a:fld>
             <a:endParaRPr lang="zh-CN" altLang="en-US"/>
           </a:p>
@@ -1175,13 +1197,13 @@
   <p:clrMapOvr>
     <a:masterClrMapping/>
   </p:clrMapOvr>
-  <mc:AlternateContent xmlns:mc="http://schemas.openxmlformats.org/markup-compatibility/2006">
-    <mc:Choice xmlns:p14="http://schemas.microsoft.com/office/powerpoint/2010/main" Requires="p14">
+  <mc:AlternateContent xmlns:mc="http://schemas.openxmlformats.org/markup-compatibility/2006" xmlns:p14="http://schemas.microsoft.com/office/powerpoint/2010/main">
+    <mc:Choice Requires="p14">
       <p:transition spd="slow" p14:dur="1500">
         <p:random/>
       </p:transition>
     </mc:Choice>
-    <mc:Fallback>
+    <mc:Fallback xmlns="">
       <p:transition spd="slow">
         <p:random/>
       </p:transition>
@@ -1260,7 +1282,6 @@
               <a:rPr lang="zh-CN" altLang="en-US"/>
               <a:t>编辑母版文本样式</a:t>
             </a:r>
-            <a:endParaRPr lang="zh-CN" altLang="en-US"/>
           </a:p>
           <a:p>
             <a:pPr lvl="1"/>
@@ -1268,7 +1289,6 @@
               <a:rPr lang="zh-CN" altLang="en-US"/>
               <a:t>第二级</a:t>
             </a:r>
-            <a:endParaRPr lang="zh-CN" altLang="en-US"/>
           </a:p>
           <a:p>
             <a:pPr lvl="2"/>
@@ -1276,7 +1296,6 @@
               <a:rPr lang="zh-CN" altLang="en-US"/>
               <a:t>第三级</a:t>
             </a:r>
-            <a:endParaRPr lang="zh-CN" altLang="en-US"/>
           </a:p>
           <a:p>
             <a:pPr lvl="3"/>
@@ -1284,7 +1303,6 @@
               <a:rPr lang="zh-CN" altLang="en-US"/>
               <a:t>第四级</a:t>
             </a:r>
-            <a:endParaRPr lang="zh-CN" altLang="en-US"/>
           </a:p>
           <a:p>
             <a:pPr lvl="4"/>
@@ -1313,6 +1331,7 @@
           <a:p>
             <a:fld id="{95666703-9F6B-41A9-8273-A226E2EEC7FD}" type="datetimeFigureOut">
               <a:rPr lang="zh-CN" altLang="en-US" smtClean="0"/>
+              <a:t>2019/11/6</a:t>
             </a:fld>
             <a:endParaRPr lang="zh-CN" altLang="en-US"/>
           </a:p>
@@ -1354,6 +1373,7 @@
           <a:p>
             <a:fld id="{4F9A4CF2-39D5-471D-AEEA-44C9DDC76718}" type="slidenum">
               <a:rPr lang="zh-CN" altLang="en-US" smtClean="0"/>
+              <a:t>‹#›</a:t>
             </a:fld>
             <a:endParaRPr lang="zh-CN" altLang="en-US"/>
           </a:p>
@@ -1364,13 +1384,13 @@
   <p:clrMapOvr>
     <a:masterClrMapping/>
   </p:clrMapOvr>
-  <mc:AlternateContent xmlns:mc="http://schemas.openxmlformats.org/markup-compatibility/2006">
-    <mc:Choice xmlns:p14="http://schemas.microsoft.com/office/powerpoint/2010/main" Requires="p14">
+  <mc:AlternateContent xmlns:mc="http://schemas.openxmlformats.org/markup-compatibility/2006" xmlns:p14="http://schemas.microsoft.com/office/powerpoint/2010/main">
+    <mc:Choice Requires="p14">
       <p:transition spd="slow" p14:dur="1500">
         <p:random/>
       </p:transition>
     </mc:Choice>
-    <mc:Fallback>
+    <mc:Fallback xmlns="">
       <p:transition spd="slow">
         <p:random/>
       </p:transition>
@@ -1510,6 +1530,7 @@
           <a:p>
             <a:fld id="{9C3DB8B4-2C49-4FA1-8C80-9F8CC676210A}" type="datetimeFigureOut">
               <a:rPr lang="zh-CN" altLang="en-US" smtClean="0"/>
+              <a:t>2019/11/6</a:t>
             </a:fld>
             <a:endParaRPr lang="zh-CN" altLang="en-US"/>
           </a:p>
@@ -1551,6 +1572,7 @@
           <a:p>
             <a:fld id="{B662284E-E4CE-4A2F-8620-F19FEDCC162F}" type="slidenum">
               <a:rPr lang="zh-CN" altLang="en-US" smtClean="0"/>
+              <a:t>‹#›</a:t>
             </a:fld>
             <a:endParaRPr lang="zh-CN" altLang="en-US"/>
           </a:p>
@@ -1561,13 +1583,13 @@
   <p:clrMapOvr>
     <a:masterClrMapping/>
   </p:clrMapOvr>
-  <mc:AlternateContent xmlns:mc="http://schemas.openxmlformats.org/markup-compatibility/2006">
-    <mc:Choice xmlns:p14="http://schemas.microsoft.com/office/powerpoint/2010/main" Requires="p14">
+  <mc:AlternateContent xmlns:mc="http://schemas.openxmlformats.org/markup-compatibility/2006" xmlns:p14="http://schemas.microsoft.com/office/powerpoint/2010/main">
+    <mc:Choice Requires="p14">
       <p:transition spd="slow" p14:dur="1500">
         <p:random/>
       </p:transition>
     </mc:Choice>
-    <mc:Fallback>
+    <mc:Fallback xmlns="">
       <p:transition spd="slow">
         <p:random/>
       </p:transition>
@@ -1598,13 +1620,13 @@
   <p:clrMapOvr>
     <a:masterClrMapping/>
   </p:clrMapOvr>
-  <mc:AlternateContent xmlns:mc="http://schemas.openxmlformats.org/markup-compatibility/2006">
-    <mc:Choice xmlns:p14="http://schemas.microsoft.com/office/powerpoint/2010/main" Requires="p14">
+  <mc:AlternateContent xmlns:mc="http://schemas.openxmlformats.org/markup-compatibility/2006" xmlns:p14="http://schemas.microsoft.com/office/powerpoint/2010/main">
+    <mc:Choice Requires="p14">
       <p:transition spd="slow" p14:dur="1500">
         <p:random/>
       </p:transition>
     </mc:Choice>
-    <mc:Fallback>
+    <mc:Fallback xmlns="">
       <p:transition spd="slow">
         <p:random/>
       </p:transition>
@@ -1720,7 +1742,6 @@
               <a:rPr lang="zh-CN" altLang="en-US"/>
               <a:t>编辑母版文本样式</a:t>
             </a:r>
-            <a:endParaRPr lang="zh-CN" altLang="en-US"/>
           </a:p>
         </p:txBody>
       </p:sp>
@@ -1749,7 +1770,6 @@
               <a:rPr lang="zh-CN" altLang="en-US"/>
               <a:t>编辑母版文本样式</a:t>
             </a:r>
-            <a:endParaRPr lang="zh-CN" altLang="en-US"/>
           </a:p>
           <a:p>
             <a:pPr lvl="1"/>
@@ -1757,7 +1777,6 @@
               <a:rPr lang="zh-CN" altLang="en-US"/>
               <a:t>第二级</a:t>
             </a:r>
-            <a:endParaRPr lang="zh-CN" altLang="en-US"/>
           </a:p>
           <a:p>
             <a:pPr lvl="2"/>
@@ -1765,7 +1784,6 @@
               <a:rPr lang="zh-CN" altLang="en-US"/>
               <a:t>第三级</a:t>
             </a:r>
-            <a:endParaRPr lang="zh-CN" altLang="en-US"/>
           </a:p>
           <a:p>
             <a:pPr lvl="3"/>
@@ -1773,7 +1791,6 @@
               <a:rPr lang="zh-CN" altLang="en-US"/>
               <a:t>第四级</a:t>
             </a:r>
-            <a:endParaRPr lang="zh-CN" altLang="en-US"/>
           </a:p>
           <a:p>
             <a:pPr lvl="4"/>
@@ -1847,7 +1864,6 @@
               <a:rPr lang="zh-CN" altLang="en-US"/>
               <a:t>编辑母版文本样式</a:t>
             </a:r>
-            <a:endParaRPr lang="zh-CN" altLang="en-US"/>
           </a:p>
         </p:txBody>
       </p:sp>
@@ -1876,7 +1892,6 @@
               <a:rPr lang="zh-CN" altLang="en-US"/>
               <a:t>编辑母版文本样式</a:t>
             </a:r>
-            <a:endParaRPr lang="zh-CN" altLang="en-US"/>
           </a:p>
           <a:p>
             <a:pPr lvl="1"/>
@@ -1884,7 +1899,6 @@
               <a:rPr lang="zh-CN" altLang="en-US"/>
               <a:t>第二级</a:t>
             </a:r>
-            <a:endParaRPr lang="zh-CN" altLang="en-US"/>
           </a:p>
           <a:p>
             <a:pPr lvl="2"/>
@@ -1892,7 +1906,6 @@
               <a:rPr lang="zh-CN" altLang="en-US"/>
               <a:t>第三级</a:t>
             </a:r>
-            <a:endParaRPr lang="zh-CN" altLang="en-US"/>
           </a:p>
           <a:p>
             <a:pPr lvl="3"/>
@@ -1900,7 +1913,6 @@
               <a:rPr lang="zh-CN" altLang="en-US"/>
               <a:t>第四级</a:t>
             </a:r>
-            <a:endParaRPr lang="zh-CN" altLang="en-US"/>
           </a:p>
           <a:p>
             <a:pPr lvl="4"/>
@@ -1929,6 +1941,7 @@
           <a:p>
             <a:fld id="{9C3DB8B4-2C49-4FA1-8C80-9F8CC676210A}" type="datetimeFigureOut">
               <a:rPr lang="zh-CN" altLang="en-US" smtClean="0"/>
+              <a:t>2019/11/6</a:t>
             </a:fld>
             <a:endParaRPr lang="zh-CN" altLang="en-US"/>
           </a:p>
@@ -1970,6 +1983,7 @@
           <a:p>
             <a:fld id="{B662284E-E4CE-4A2F-8620-F19FEDCC162F}" type="slidenum">
               <a:rPr lang="zh-CN" altLang="en-US" smtClean="0"/>
+              <a:t>‹#›</a:t>
             </a:fld>
             <a:endParaRPr lang="zh-CN" altLang="en-US"/>
           </a:p>
@@ -1980,13 +1994,13 @@
   <p:clrMapOvr>
     <a:masterClrMapping/>
   </p:clrMapOvr>
-  <mc:AlternateContent xmlns:mc="http://schemas.openxmlformats.org/markup-compatibility/2006">
-    <mc:Choice xmlns:p14="http://schemas.microsoft.com/office/powerpoint/2010/main" Requires="p14">
+  <mc:AlternateContent xmlns:mc="http://schemas.openxmlformats.org/markup-compatibility/2006" xmlns:p14="http://schemas.microsoft.com/office/powerpoint/2010/main">
+    <mc:Choice Requires="p14">
       <p:transition spd="slow" p14:dur="1500">
         <p:random/>
       </p:transition>
     </mc:Choice>
-    <mc:Fallback>
+    <mc:Fallback xmlns="">
       <p:transition spd="slow">
         <p:random/>
       </p:transition>
@@ -2052,6 +2066,7 @@
           <a:p>
             <a:fld id="{9C3DB8B4-2C49-4FA1-8C80-9F8CC676210A}" type="datetimeFigureOut">
               <a:rPr lang="zh-CN" altLang="en-US" smtClean="0"/>
+              <a:t>2019/11/6</a:t>
             </a:fld>
             <a:endParaRPr lang="zh-CN" altLang="en-US"/>
           </a:p>
@@ -2093,6 +2108,7 @@
           <a:p>
             <a:fld id="{B662284E-E4CE-4A2F-8620-F19FEDCC162F}" type="slidenum">
               <a:rPr lang="zh-CN" altLang="en-US" smtClean="0"/>
+              <a:t>‹#›</a:t>
             </a:fld>
             <a:endParaRPr lang="zh-CN" altLang="en-US"/>
           </a:p>
@@ -2103,13 +2119,13 @@
   <p:clrMapOvr>
     <a:masterClrMapping/>
   </p:clrMapOvr>
-  <mc:AlternateContent xmlns:mc="http://schemas.openxmlformats.org/markup-compatibility/2006">
-    <mc:Choice xmlns:p14="http://schemas.microsoft.com/office/powerpoint/2010/main" Requires="p14">
+  <mc:AlternateContent xmlns:mc="http://schemas.openxmlformats.org/markup-compatibility/2006" xmlns:p14="http://schemas.microsoft.com/office/powerpoint/2010/main">
+    <mc:Choice Requires="p14">
       <p:transition spd="slow" p14:dur="1500">
         <p:random/>
       </p:transition>
     </mc:Choice>
-    <mc:Fallback>
+    <mc:Fallback xmlns="">
       <p:transition spd="slow">
         <p:random/>
       </p:transition>
@@ -2152,6 +2168,7 @@
           <a:p>
             <a:fld id="{9C3DB8B4-2C49-4FA1-8C80-9F8CC676210A}" type="datetimeFigureOut">
               <a:rPr lang="zh-CN" altLang="en-US" smtClean="0"/>
+              <a:t>2019/11/6</a:t>
             </a:fld>
             <a:endParaRPr lang="zh-CN" altLang="en-US"/>
           </a:p>
@@ -2193,6 +2210,7 @@
           <a:p>
             <a:fld id="{B662284E-E4CE-4A2F-8620-F19FEDCC162F}" type="slidenum">
               <a:rPr lang="zh-CN" altLang="en-US" smtClean="0"/>
+              <a:t>‹#›</a:t>
             </a:fld>
             <a:endParaRPr lang="zh-CN" altLang="en-US"/>
           </a:p>
@@ -2203,13 +2221,13 @@
   <p:clrMapOvr>
     <a:masterClrMapping/>
   </p:clrMapOvr>
-  <mc:AlternateContent xmlns:mc="http://schemas.openxmlformats.org/markup-compatibility/2006">
-    <mc:Choice xmlns:p14="http://schemas.microsoft.com/office/powerpoint/2010/main" Requires="p14">
+  <mc:AlternateContent xmlns:mc="http://schemas.openxmlformats.org/markup-compatibility/2006" xmlns:p14="http://schemas.microsoft.com/office/powerpoint/2010/main">
+    <mc:Choice Requires="p14">
       <p:transition spd="slow" p14:dur="1500">
         <p:random/>
       </p:transition>
     </mc:Choice>
-    <mc:Fallback>
+    <mc:Fallback xmlns="">
       <p:transition spd="slow">
         <p:random/>
       </p:transition>
@@ -2271,13 +2289,13 @@
   <p:clrMapOvr>
     <a:masterClrMapping/>
   </p:clrMapOvr>
-  <mc:AlternateContent xmlns:mc="http://schemas.openxmlformats.org/markup-compatibility/2006">
-    <mc:Choice xmlns:p14="http://schemas.microsoft.com/office/powerpoint/2010/main" Requires="p14">
+  <mc:AlternateContent xmlns:mc="http://schemas.openxmlformats.org/markup-compatibility/2006" xmlns:p14="http://schemas.microsoft.com/office/powerpoint/2010/main">
+    <mc:Choice Requires="p14">
       <p:transition spd="slow" p14:dur="1500">
         <p:random/>
       </p:transition>
     </mc:Choice>
-    <mc:Fallback>
+    <mc:Fallback xmlns="">
       <p:transition spd="slow">
         <p:random/>
       </p:transition>
@@ -2388,7 +2406,6 @@
               <a:rPr lang="zh-CN" altLang="en-US"/>
               <a:t>编辑母版文本样式</a:t>
             </a:r>
-            <a:endParaRPr lang="zh-CN" altLang="en-US"/>
           </a:p>
           <a:p>
             <a:pPr lvl="1"/>
@@ -2396,7 +2413,6 @@
               <a:rPr lang="zh-CN" altLang="en-US"/>
               <a:t>第二级</a:t>
             </a:r>
-            <a:endParaRPr lang="zh-CN" altLang="en-US"/>
           </a:p>
           <a:p>
             <a:pPr lvl="2"/>
@@ -2404,7 +2420,6 @@
               <a:rPr lang="zh-CN" altLang="en-US"/>
               <a:t>第三级</a:t>
             </a:r>
-            <a:endParaRPr lang="zh-CN" altLang="en-US"/>
           </a:p>
           <a:p>
             <a:pPr lvl="3"/>
@@ -2412,7 +2427,6 @@
               <a:rPr lang="zh-CN" altLang="en-US"/>
               <a:t>第四级</a:t>
             </a:r>
-            <a:endParaRPr lang="zh-CN" altLang="en-US"/>
           </a:p>
           <a:p>
             <a:pPr lvl="4"/>
@@ -2486,7 +2500,6 @@
               <a:rPr lang="zh-CN" altLang="en-US"/>
               <a:t>编辑母版文本样式</a:t>
             </a:r>
-            <a:endParaRPr lang="zh-CN" altLang="en-US"/>
           </a:p>
         </p:txBody>
       </p:sp>
@@ -2507,6 +2520,7 @@
           <a:p>
             <a:fld id="{9C3DB8B4-2C49-4FA1-8C80-9F8CC676210A}" type="datetimeFigureOut">
               <a:rPr lang="zh-CN" altLang="en-US" smtClean="0"/>
+              <a:t>2019/11/6</a:t>
             </a:fld>
             <a:endParaRPr lang="zh-CN" altLang="en-US"/>
           </a:p>
@@ -2548,6 +2562,7 @@
           <a:p>
             <a:fld id="{B662284E-E4CE-4A2F-8620-F19FEDCC162F}" type="slidenum">
               <a:rPr lang="zh-CN" altLang="en-US" smtClean="0"/>
+              <a:t>‹#›</a:t>
             </a:fld>
             <a:endParaRPr lang="zh-CN" altLang="en-US"/>
           </a:p>
@@ -2558,13 +2573,13 @@
   <p:clrMapOvr>
     <a:masterClrMapping/>
   </p:clrMapOvr>
-  <mc:AlternateContent xmlns:mc="http://schemas.openxmlformats.org/markup-compatibility/2006">
-    <mc:Choice xmlns:p14="http://schemas.microsoft.com/office/powerpoint/2010/main" Requires="p14">
+  <mc:AlternateContent xmlns:mc="http://schemas.openxmlformats.org/markup-compatibility/2006" xmlns:p14="http://schemas.microsoft.com/office/powerpoint/2010/main">
+    <mc:Choice Requires="p14">
       <p:transition spd="slow" p14:dur="1500">
         <p:random/>
       </p:transition>
     </mc:Choice>
-    <mc:Fallback>
+    <mc:Fallback xmlns="">
       <p:transition spd="slow">
         <p:random/>
       </p:transition>
@@ -2749,7 +2764,6 @@
               <a:rPr lang="zh-CN" altLang="en-US"/>
               <a:t>编辑母版文本样式</a:t>
             </a:r>
-            <a:endParaRPr lang="zh-CN" altLang="en-US"/>
           </a:p>
         </p:txBody>
       </p:sp>
@@ -2770,6 +2784,7 @@
           <a:p>
             <a:fld id="{9C3DB8B4-2C49-4FA1-8C80-9F8CC676210A}" type="datetimeFigureOut">
               <a:rPr lang="zh-CN" altLang="en-US" smtClean="0"/>
+              <a:t>2019/11/6</a:t>
             </a:fld>
             <a:endParaRPr lang="zh-CN" altLang="en-US"/>
           </a:p>
@@ -2811,6 +2826,7 @@
           <a:p>
             <a:fld id="{B662284E-E4CE-4A2F-8620-F19FEDCC162F}" type="slidenum">
               <a:rPr lang="zh-CN" altLang="en-US" smtClean="0"/>
+              <a:t>‹#›</a:t>
             </a:fld>
             <a:endParaRPr lang="zh-CN" altLang="en-US"/>
           </a:p>
@@ -2821,13 +2837,13 @@
   <p:clrMapOvr>
     <a:masterClrMapping/>
   </p:clrMapOvr>
-  <mc:AlternateContent xmlns:mc="http://schemas.openxmlformats.org/markup-compatibility/2006">
-    <mc:Choice xmlns:p14="http://schemas.microsoft.com/office/powerpoint/2010/main" Requires="p14">
+  <mc:AlternateContent xmlns:mc="http://schemas.openxmlformats.org/markup-compatibility/2006" xmlns:p14="http://schemas.microsoft.com/office/powerpoint/2010/main">
+    <mc:Choice Requires="p14">
       <p:transition spd="slow" p14:dur="1500">
         <p:random/>
       </p:transition>
     </mc:Choice>
-    <mc:Fallback>
+    <mc:Fallback xmlns="">
       <p:transition spd="slow">
         <p:random/>
       </p:transition>
@@ -2896,7 +2912,6 @@
               <a:rPr lang="zh-CN" altLang="en-US"/>
               <a:t>编辑母版文本样式</a:t>
             </a:r>
-            <a:endParaRPr lang="zh-CN" altLang="en-US"/>
           </a:p>
           <a:p>
             <a:pPr lvl="1"/>
@@ -2904,7 +2919,6 @@
               <a:rPr lang="zh-CN" altLang="en-US"/>
               <a:t>第二级</a:t>
             </a:r>
-            <a:endParaRPr lang="zh-CN" altLang="en-US"/>
           </a:p>
           <a:p>
             <a:pPr lvl="2"/>
@@ -2912,7 +2926,6 @@
               <a:rPr lang="zh-CN" altLang="en-US"/>
               <a:t>第三级</a:t>
             </a:r>
-            <a:endParaRPr lang="zh-CN" altLang="en-US"/>
           </a:p>
           <a:p>
             <a:pPr lvl="3"/>
@@ -2920,7 +2933,6 @@
               <a:rPr lang="zh-CN" altLang="en-US"/>
               <a:t>第四级</a:t>
             </a:r>
-            <a:endParaRPr lang="zh-CN" altLang="en-US"/>
           </a:p>
           <a:p>
             <a:pPr lvl="4"/>
@@ -2949,6 +2961,7 @@
           <a:p>
             <a:fld id="{9C3DB8B4-2C49-4FA1-8C80-9F8CC676210A}" type="datetimeFigureOut">
               <a:rPr lang="zh-CN" altLang="en-US" smtClean="0"/>
+              <a:t>2019/11/6</a:t>
             </a:fld>
             <a:endParaRPr lang="zh-CN" altLang="en-US"/>
           </a:p>
@@ -2990,6 +3003,7 @@
           <a:p>
             <a:fld id="{B662284E-E4CE-4A2F-8620-F19FEDCC162F}" type="slidenum">
               <a:rPr lang="zh-CN" altLang="en-US" smtClean="0"/>
+              <a:t>‹#›</a:t>
             </a:fld>
             <a:endParaRPr lang="zh-CN" altLang="en-US"/>
           </a:p>
@@ -3000,13 +3014,13 @@
   <p:clrMapOvr>
     <a:masterClrMapping/>
   </p:clrMapOvr>
-  <mc:AlternateContent xmlns:mc="http://schemas.openxmlformats.org/markup-compatibility/2006">
-    <mc:Choice xmlns:p14="http://schemas.microsoft.com/office/powerpoint/2010/main" Requires="p14">
+  <mc:AlternateContent xmlns:mc="http://schemas.openxmlformats.org/markup-compatibility/2006" xmlns:p14="http://schemas.microsoft.com/office/powerpoint/2010/main">
+    <mc:Choice Requires="p14">
       <p:transition spd="slow" p14:dur="1500">
         <p:random/>
       </p:transition>
     </mc:Choice>
-    <mc:Fallback>
+    <mc:Fallback xmlns="">
       <p:transition spd="slow">
         <p:random/>
       </p:transition>
@@ -3085,7 +3099,6 @@
               <a:rPr lang="zh-CN" altLang="en-US"/>
               <a:t>编辑母版文本样式</a:t>
             </a:r>
-            <a:endParaRPr lang="zh-CN" altLang="en-US"/>
           </a:p>
           <a:p>
             <a:pPr lvl="1"/>
@@ -3093,7 +3106,6 @@
               <a:rPr lang="zh-CN" altLang="en-US"/>
               <a:t>第二级</a:t>
             </a:r>
-            <a:endParaRPr lang="zh-CN" altLang="en-US"/>
           </a:p>
           <a:p>
             <a:pPr lvl="2"/>
@@ -3101,7 +3113,6 @@
               <a:rPr lang="zh-CN" altLang="en-US"/>
               <a:t>第三级</a:t>
             </a:r>
-            <a:endParaRPr lang="zh-CN" altLang="en-US"/>
           </a:p>
           <a:p>
             <a:pPr lvl="3"/>
@@ -3109,7 +3120,6 @@
               <a:rPr lang="zh-CN" altLang="en-US"/>
               <a:t>第四级</a:t>
             </a:r>
-            <a:endParaRPr lang="zh-CN" altLang="en-US"/>
           </a:p>
           <a:p>
             <a:pPr lvl="4"/>
@@ -3138,6 +3148,7 @@
           <a:p>
             <a:fld id="{9C3DB8B4-2C49-4FA1-8C80-9F8CC676210A}" type="datetimeFigureOut">
               <a:rPr lang="zh-CN" altLang="en-US" smtClean="0"/>
+              <a:t>2019/11/6</a:t>
             </a:fld>
             <a:endParaRPr lang="zh-CN" altLang="en-US"/>
           </a:p>
@@ -3179,6 +3190,7 @@
           <a:p>
             <a:fld id="{B662284E-E4CE-4A2F-8620-F19FEDCC162F}" type="slidenum">
               <a:rPr lang="zh-CN" altLang="en-US" smtClean="0"/>
+              <a:t>‹#›</a:t>
             </a:fld>
             <a:endParaRPr lang="zh-CN" altLang="en-US"/>
           </a:p>
@@ -3189,13 +3201,13 @@
   <p:clrMapOvr>
     <a:masterClrMapping/>
   </p:clrMapOvr>
-  <mc:AlternateContent xmlns:mc="http://schemas.openxmlformats.org/markup-compatibility/2006">
-    <mc:Choice xmlns:p14="http://schemas.microsoft.com/office/powerpoint/2010/main" Requires="p14">
+  <mc:AlternateContent xmlns:mc="http://schemas.openxmlformats.org/markup-compatibility/2006" xmlns:p14="http://schemas.microsoft.com/office/powerpoint/2010/main">
+    <mc:Choice Requires="p14">
       <p:transition spd="slow" p14:dur="1500">
         <p:random/>
       </p:transition>
     </mc:Choice>
-    <mc:Fallback>
+    <mc:Fallback xmlns="">
       <p:transition spd="slow">
         <p:random/>
       </p:transition>
@@ -3257,13 +3269,13 @@
   <p:clrMapOvr>
     <a:masterClrMapping/>
   </p:clrMapOvr>
-  <mc:AlternateContent xmlns:mc="http://schemas.openxmlformats.org/markup-compatibility/2006">
-    <mc:Choice xmlns:p14="http://schemas.microsoft.com/office/powerpoint/2010/main" Requires="p14">
+  <mc:AlternateContent xmlns:mc="http://schemas.openxmlformats.org/markup-compatibility/2006" xmlns:p14="http://schemas.microsoft.com/office/powerpoint/2010/main">
+    <mc:Choice Requires="p14">
       <p:transition spd="slow" p14:dur="1500">
         <p:random/>
       </p:transition>
     </mc:Choice>
-    <mc:Fallback>
+    <mc:Fallback xmlns="">
       <p:transition spd="slow">
         <p:random/>
       </p:transition>
@@ -3325,13 +3337,13 @@
   <p:clrMapOvr>
     <a:masterClrMapping/>
   </p:clrMapOvr>
-  <mc:AlternateContent xmlns:mc="http://schemas.openxmlformats.org/markup-compatibility/2006">
-    <mc:Choice xmlns:p14="http://schemas.microsoft.com/office/powerpoint/2010/main" Requires="p14">
+  <mc:AlternateContent xmlns:mc="http://schemas.openxmlformats.org/markup-compatibility/2006" xmlns:p14="http://schemas.microsoft.com/office/powerpoint/2010/main">
+    <mc:Choice Requires="p14">
       <p:transition spd="slow" p14:dur="1500">
         <p:random/>
       </p:transition>
     </mc:Choice>
-    <mc:Fallback>
+    <mc:Fallback xmlns="">
       <p:transition spd="slow">
         <p:random/>
       </p:transition>
@@ -3489,13 +3501,13 @@
   <p:clrMapOvr>
     <a:masterClrMapping/>
   </p:clrMapOvr>
-  <mc:AlternateContent xmlns:mc="http://schemas.openxmlformats.org/markup-compatibility/2006">
-    <mc:Choice xmlns:p14="http://schemas.microsoft.com/office/powerpoint/2010/main" Requires="p14">
+  <mc:AlternateContent xmlns:mc="http://schemas.openxmlformats.org/markup-compatibility/2006" xmlns:p14="http://schemas.microsoft.com/office/powerpoint/2010/main">
+    <mc:Choice Requires="p14">
       <p:transition spd="slow" p14:dur="1500">
         <p:random/>
       </p:transition>
     </mc:Choice>
-    <mc:Fallback>
+    <mc:Fallback xmlns="">
       <p:transition spd="slow">
         <p:random/>
       </p:transition>
@@ -3557,13 +3569,13 @@
   <p:clrMapOvr>
     <a:masterClrMapping/>
   </p:clrMapOvr>
-  <mc:AlternateContent xmlns:mc="http://schemas.openxmlformats.org/markup-compatibility/2006">
-    <mc:Choice xmlns:p14="http://schemas.microsoft.com/office/powerpoint/2010/main" Requires="p14">
+  <mc:AlternateContent xmlns:mc="http://schemas.openxmlformats.org/markup-compatibility/2006" xmlns:p14="http://schemas.microsoft.com/office/powerpoint/2010/main">
+    <mc:Choice Requires="p14">
       <p:transition spd="slow" p14:dur="1500">
         <p:random/>
       </p:transition>
     </mc:Choice>
-    <mc:Fallback>
+    <mc:Fallback xmlns="">
       <p:transition spd="slow">
         <p:random/>
       </p:transition>
@@ -3637,7 +3649,6 @@
               <a:rPr lang="zh-CN" altLang="en-US"/>
               <a:t>编辑母版文本样式</a:t>
             </a:r>
-            <a:endParaRPr lang="zh-CN" altLang="en-US"/>
           </a:p>
           <a:p>
             <a:pPr lvl="1"/>
@@ -3645,7 +3656,6 @@
               <a:rPr lang="zh-CN" altLang="en-US"/>
               <a:t>第二级</a:t>
             </a:r>
-            <a:endParaRPr lang="zh-CN" altLang="en-US"/>
           </a:p>
           <a:p>
             <a:pPr lvl="2"/>
@@ -3653,7 +3663,6 @@
               <a:rPr lang="zh-CN" altLang="en-US"/>
               <a:t>第三级</a:t>
             </a:r>
-            <a:endParaRPr lang="zh-CN" altLang="en-US"/>
           </a:p>
           <a:p>
             <a:pPr lvl="3"/>
@@ -3661,7 +3670,6 @@
               <a:rPr lang="zh-CN" altLang="en-US"/>
               <a:t>第四级</a:t>
             </a:r>
-            <a:endParaRPr lang="zh-CN" altLang="en-US"/>
           </a:p>
           <a:p>
             <a:pPr lvl="4"/>
@@ -3698,7 +3706,6 @@
               <a:rPr lang="zh-CN" altLang="en-US"/>
               <a:t>编辑母版文本样式</a:t>
             </a:r>
-            <a:endParaRPr lang="zh-CN" altLang="en-US"/>
           </a:p>
           <a:p>
             <a:pPr lvl="1"/>
@@ -3706,7 +3713,6 @@
               <a:rPr lang="zh-CN" altLang="en-US"/>
               <a:t>第二级</a:t>
             </a:r>
-            <a:endParaRPr lang="zh-CN" altLang="en-US"/>
           </a:p>
           <a:p>
             <a:pPr lvl="2"/>
@@ -3714,7 +3720,6 @@
               <a:rPr lang="zh-CN" altLang="en-US"/>
               <a:t>第三级</a:t>
             </a:r>
-            <a:endParaRPr lang="zh-CN" altLang="en-US"/>
           </a:p>
           <a:p>
             <a:pPr lvl="3"/>
@@ -3722,7 +3727,6 @@
               <a:rPr lang="zh-CN" altLang="en-US"/>
               <a:t>第四级</a:t>
             </a:r>
-            <a:endParaRPr lang="zh-CN" altLang="en-US"/>
           </a:p>
           <a:p>
             <a:pPr lvl="4"/>
@@ -3751,6 +3755,7 @@
           <a:p>
             <a:fld id="{95666703-9F6B-41A9-8273-A226E2EEC7FD}" type="datetimeFigureOut">
               <a:rPr lang="zh-CN" altLang="en-US" smtClean="0"/>
+              <a:t>2019/11/6</a:t>
             </a:fld>
             <a:endParaRPr lang="zh-CN" altLang="en-US"/>
           </a:p>
@@ -3792,6 +3797,7 @@
           <a:p>
             <a:fld id="{4F9A4CF2-39D5-471D-AEEA-44C9DDC76718}" type="slidenum">
               <a:rPr lang="zh-CN" altLang="en-US" smtClean="0"/>
+              <a:t>‹#›</a:t>
             </a:fld>
             <a:endParaRPr lang="zh-CN" altLang="en-US"/>
           </a:p>
@@ -3802,13 +3808,13 @@
   <p:clrMapOvr>
     <a:masterClrMapping/>
   </p:clrMapOvr>
-  <mc:AlternateContent xmlns:mc="http://schemas.openxmlformats.org/markup-compatibility/2006">
-    <mc:Choice xmlns:p14="http://schemas.microsoft.com/office/powerpoint/2010/main" Requires="p14">
+  <mc:AlternateContent xmlns:mc="http://schemas.openxmlformats.org/markup-compatibility/2006" xmlns:p14="http://schemas.microsoft.com/office/powerpoint/2010/main">
+    <mc:Choice Requires="p14">
       <p:transition spd="slow" p14:dur="1500">
         <p:random/>
       </p:transition>
     </mc:Choice>
-    <mc:Fallback>
+    <mc:Fallback xmlns="">
       <p:transition spd="slow">
         <p:random/>
       </p:transition>
@@ -3924,7 +3930,6 @@
               <a:rPr lang="zh-CN" altLang="en-US"/>
               <a:t>编辑母版文本样式</a:t>
             </a:r>
-            <a:endParaRPr lang="zh-CN" altLang="en-US"/>
           </a:p>
         </p:txBody>
       </p:sp>
@@ -3953,7 +3958,6 @@
               <a:rPr lang="zh-CN" altLang="en-US"/>
               <a:t>编辑母版文本样式</a:t>
             </a:r>
-            <a:endParaRPr lang="zh-CN" altLang="en-US"/>
           </a:p>
           <a:p>
             <a:pPr lvl="1"/>
@@ -3961,7 +3965,6 @@
               <a:rPr lang="zh-CN" altLang="en-US"/>
               <a:t>第二级</a:t>
             </a:r>
-            <a:endParaRPr lang="zh-CN" altLang="en-US"/>
           </a:p>
           <a:p>
             <a:pPr lvl="2"/>
@@ -3969,7 +3972,6 @@
               <a:rPr lang="zh-CN" altLang="en-US"/>
               <a:t>第三级</a:t>
             </a:r>
-            <a:endParaRPr lang="zh-CN" altLang="en-US"/>
           </a:p>
           <a:p>
             <a:pPr lvl="3"/>
@@ -3977,7 +3979,6 @@
               <a:rPr lang="zh-CN" altLang="en-US"/>
               <a:t>第四级</a:t>
             </a:r>
-            <a:endParaRPr lang="zh-CN" altLang="en-US"/>
           </a:p>
           <a:p>
             <a:pPr lvl="4"/>
@@ -4051,7 +4052,6 @@
               <a:rPr lang="zh-CN" altLang="en-US"/>
               <a:t>编辑母版文本样式</a:t>
             </a:r>
-            <a:endParaRPr lang="zh-CN" altLang="en-US"/>
           </a:p>
         </p:txBody>
       </p:sp>
@@ -4080,7 +4080,6 @@
               <a:rPr lang="zh-CN" altLang="en-US"/>
               <a:t>编辑母版文本样式</a:t>
             </a:r>
-            <a:endParaRPr lang="zh-CN" altLang="en-US"/>
           </a:p>
           <a:p>
             <a:pPr lvl="1"/>
@@ -4088,7 +4087,6 @@
               <a:rPr lang="zh-CN" altLang="en-US"/>
               <a:t>第二级</a:t>
             </a:r>
-            <a:endParaRPr lang="zh-CN" altLang="en-US"/>
           </a:p>
           <a:p>
             <a:pPr lvl="2"/>
@@ -4096,7 +4094,6 @@
               <a:rPr lang="zh-CN" altLang="en-US"/>
               <a:t>第三级</a:t>
             </a:r>
-            <a:endParaRPr lang="zh-CN" altLang="en-US"/>
           </a:p>
           <a:p>
             <a:pPr lvl="3"/>
@@ -4104,7 +4101,6 @@
               <a:rPr lang="zh-CN" altLang="en-US"/>
               <a:t>第四级</a:t>
             </a:r>
-            <a:endParaRPr lang="zh-CN" altLang="en-US"/>
           </a:p>
           <a:p>
             <a:pPr lvl="4"/>
@@ -4133,6 +4129,7 @@
           <a:p>
             <a:fld id="{95666703-9F6B-41A9-8273-A226E2EEC7FD}" type="datetimeFigureOut">
               <a:rPr lang="zh-CN" altLang="en-US" smtClean="0"/>
+              <a:t>2019/11/6</a:t>
             </a:fld>
             <a:endParaRPr lang="zh-CN" altLang="en-US"/>
           </a:p>
@@ -4174,6 +4171,7 @@
           <a:p>
             <a:fld id="{4F9A4CF2-39D5-471D-AEEA-44C9DDC76718}" type="slidenum">
               <a:rPr lang="zh-CN" altLang="en-US" smtClean="0"/>
+              <a:t>‹#›</a:t>
             </a:fld>
             <a:endParaRPr lang="zh-CN" altLang="en-US"/>
           </a:p>
@@ -4184,13 +4182,13 @@
   <p:clrMapOvr>
     <a:masterClrMapping/>
   </p:clrMapOvr>
-  <mc:AlternateContent xmlns:mc="http://schemas.openxmlformats.org/markup-compatibility/2006">
-    <mc:Choice xmlns:p14="http://schemas.microsoft.com/office/powerpoint/2010/main" Requires="p14">
+  <mc:AlternateContent xmlns:mc="http://schemas.openxmlformats.org/markup-compatibility/2006" xmlns:p14="http://schemas.microsoft.com/office/powerpoint/2010/main">
+    <mc:Choice Requires="p14">
       <p:transition spd="slow" p14:dur="1500">
         <p:random/>
       </p:transition>
     </mc:Choice>
-    <mc:Fallback>
+    <mc:Fallback xmlns="">
       <p:transition spd="slow">
         <p:random/>
       </p:transition>
@@ -4256,6 +4254,7 @@
           <a:p>
             <a:fld id="{95666703-9F6B-41A9-8273-A226E2EEC7FD}" type="datetimeFigureOut">
               <a:rPr lang="zh-CN" altLang="en-US" smtClean="0"/>
+              <a:t>2019/11/6</a:t>
             </a:fld>
             <a:endParaRPr lang="zh-CN" altLang="en-US"/>
           </a:p>
@@ -4297,6 +4296,7 @@
           <a:p>
             <a:fld id="{4F9A4CF2-39D5-471D-AEEA-44C9DDC76718}" type="slidenum">
               <a:rPr lang="zh-CN" altLang="en-US" smtClean="0"/>
+              <a:t>‹#›</a:t>
             </a:fld>
             <a:endParaRPr lang="zh-CN" altLang="en-US"/>
           </a:p>
@@ -4307,13 +4307,13 @@
   <p:clrMapOvr>
     <a:masterClrMapping/>
   </p:clrMapOvr>
-  <mc:AlternateContent xmlns:mc="http://schemas.openxmlformats.org/markup-compatibility/2006">
-    <mc:Choice xmlns:p14="http://schemas.microsoft.com/office/powerpoint/2010/main" Requires="p14">
+  <mc:AlternateContent xmlns:mc="http://schemas.openxmlformats.org/markup-compatibility/2006" xmlns:p14="http://schemas.microsoft.com/office/powerpoint/2010/main">
+    <mc:Choice Requires="p14">
       <p:transition spd="slow" p14:dur="1500">
         <p:random/>
       </p:transition>
     </mc:Choice>
-    <mc:Fallback>
+    <mc:Fallback xmlns="">
       <p:transition spd="slow">
         <p:random/>
       </p:transition>
@@ -4407,7 +4407,6 @@
               <a:rPr lang="zh-CN" altLang="en-US"/>
               <a:t>编辑母版文本样式</a:t>
             </a:r>
-            <a:endParaRPr lang="zh-CN" altLang="en-US"/>
           </a:p>
           <a:p>
             <a:pPr lvl="1"/>
@@ -4415,7 +4414,6 @@
               <a:rPr lang="zh-CN" altLang="en-US"/>
               <a:t>第二级</a:t>
             </a:r>
-            <a:endParaRPr lang="zh-CN" altLang="en-US"/>
           </a:p>
           <a:p>
             <a:pPr lvl="2"/>
@@ -4423,7 +4421,6 @@
               <a:rPr lang="zh-CN" altLang="en-US"/>
               <a:t>第三级</a:t>
             </a:r>
-            <a:endParaRPr lang="zh-CN" altLang="en-US"/>
           </a:p>
           <a:p>
             <a:pPr lvl="3"/>
@@ -4431,7 +4428,6 @@
               <a:rPr lang="zh-CN" altLang="en-US"/>
               <a:t>第四级</a:t>
             </a:r>
-            <a:endParaRPr lang="zh-CN" altLang="en-US"/>
           </a:p>
           <a:p>
             <a:pPr lvl="4"/>
@@ -4478,6 +4474,7 @@
           <a:p>
             <a:fld id="{95666703-9F6B-41A9-8273-A226E2EEC7FD}" type="datetimeFigureOut">
               <a:rPr lang="zh-CN" altLang="en-US" smtClean="0"/>
+              <a:t>2019/11/6</a:t>
             </a:fld>
             <a:endParaRPr lang="zh-CN" altLang="en-US"/>
           </a:p>
@@ -4555,6 +4552,7 @@
           <a:p>
             <a:fld id="{4F9A4CF2-39D5-471D-AEEA-44C9DDC76718}" type="slidenum">
               <a:rPr lang="zh-CN" altLang="en-US" smtClean="0"/>
+              <a:t>‹#›</a:t>
             </a:fld>
             <a:endParaRPr lang="zh-CN" altLang="en-US"/>
           </a:p>
@@ -4579,13 +4577,13 @@
     <p:sldLayoutId id="2147483661" r:id="rId13"/>
     <p:sldLayoutId id="2147483662" r:id="rId14"/>
   </p:sldLayoutIdLst>
-  <mc:AlternateContent xmlns:mc="http://schemas.openxmlformats.org/markup-compatibility/2006">
-    <mc:Choice xmlns:p14="http://schemas.microsoft.com/office/powerpoint/2010/main" Requires="p14">
+  <mc:AlternateContent xmlns:mc="http://schemas.openxmlformats.org/markup-compatibility/2006" xmlns:p14="http://schemas.microsoft.com/office/powerpoint/2010/main">
+    <mc:Choice Requires="p14">
       <p:transition spd="slow" p14:dur="1500">
         <p:random/>
       </p:transition>
     </mc:Choice>
-    <mc:Fallback>
+    <mc:Fallback xmlns="">
       <p:transition spd="slow">
         <p:random/>
       </p:transition>
@@ -4959,7 +4957,6 @@
               <a:rPr lang="zh-CN" altLang="en-US"/>
               <a:t>编辑母版文本样式</a:t>
             </a:r>
-            <a:endParaRPr lang="zh-CN" altLang="en-US"/>
           </a:p>
           <a:p>
             <a:pPr lvl="1"/>
@@ -4967,7 +4964,6 @@
               <a:rPr lang="zh-CN" altLang="en-US"/>
               <a:t>第二级</a:t>
             </a:r>
-            <a:endParaRPr lang="zh-CN" altLang="en-US"/>
           </a:p>
           <a:p>
             <a:pPr lvl="2"/>
@@ -4975,7 +4971,6 @@
               <a:rPr lang="zh-CN" altLang="en-US"/>
               <a:t>第三级</a:t>
             </a:r>
-            <a:endParaRPr lang="zh-CN" altLang="en-US"/>
           </a:p>
           <a:p>
             <a:pPr lvl="3"/>
@@ -4983,7 +4978,6 @@
               <a:rPr lang="zh-CN" altLang="en-US"/>
               <a:t>第四级</a:t>
             </a:r>
-            <a:endParaRPr lang="zh-CN" altLang="en-US"/>
           </a:p>
           <a:p>
             <a:pPr lvl="4"/>
@@ -5030,6 +5024,7 @@
           <a:p>
             <a:fld id="{9C3DB8B4-2C49-4FA1-8C80-9F8CC676210A}" type="datetimeFigureOut">
               <a:rPr lang="zh-CN" altLang="en-US" smtClean="0"/>
+              <a:t>2019/11/6</a:t>
             </a:fld>
             <a:endParaRPr lang="zh-CN" altLang="en-US"/>
           </a:p>
@@ -5107,6 +5102,7 @@
           <a:p>
             <a:fld id="{B662284E-E4CE-4A2F-8620-F19FEDCC162F}" type="slidenum">
               <a:rPr lang="zh-CN" altLang="en-US" smtClean="0"/>
+              <a:t>‹#›</a:t>
             </a:fld>
             <a:endParaRPr lang="zh-CN" altLang="en-US"/>
           </a:p>
@@ -5126,13 +5122,13 @@
     <p:sldLayoutId id="2147483671" r:id="rId8"/>
     <p:sldLayoutId id="2147483672" r:id="rId9"/>
   </p:sldLayoutIdLst>
-  <mc:AlternateContent xmlns:mc="http://schemas.openxmlformats.org/markup-compatibility/2006">
-    <mc:Choice xmlns:p14="http://schemas.microsoft.com/office/powerpoint/2010/main" Requires="p14">
+  <mc:AlternateContent xmlns:mc="http://schemas.openxmlformats.org/markup-compatibility/2006" xmlns:p14="http://schemas.microsoft.com/office/powerpoint/2010/main">
+    <mc:Choice Requires="p14">
       <p:transition spd="slow" p14:dur="1500">
         <p:random/>
       </p:transition>
     </mc:Choice>
-    <mc:Fallback>
+    <mc:Fallback xmlns="">
       <p:transition spd="slow">
         <p:random/>
       </p:transition>
@@ -5488,12 +5484,6 @@
               </a:rPr>
               <a:t>-Party A</a:t>
             </a:r>
-            <a:endParaRPr lang="en-US" altLang="zh-CN" sz="2000" dirty="0">
-              <a:solidFill>
-                <a:srgbClr val="FBDED3"/>
-              </a:solidFill>
-              <a:latin typeface="Arial" panose="020B0604020202020204"/>
-            </a:endParaRPr>
           </a:p>
           <a:p>
             <a:pPr lvl="0" algn="l">
@@ -5559,19 +5549,6 @@
               </a:rPr>
               <a:t>Members(A-Z):</a:t>
             </a:r>
-            <a:endParaRPr kumimoji="0" lang="en-US" altLang="zh-CN" sz="1600" b="0" i="0" u="none" strike="noStrike" kern="1200" cap="none" spc="0" normalizeH="0" baseline="0" noProof="0" dirty="0">
-              <a:ln>
-                <a:noFill/>
-              </a:ln>
-              <a:solidFill>
-                <a:srgbClr val="FBDED3"/>
-              </a:solidFill>
-              <a:effectLst/>
-              <a:uLnTx/>
-              <a:uFillTx/>
-              <a:latin typeface="Arial" panose="020B0604020202020204"/>
-              <a:ea typeface="微软雅黑 Light" panose="020B0502040204020203" charset="-122"/>
-            </a:endParaRPr>
           </a:p>
           <a:p>
             <a:pPr lvl="0" algn="l">
@@ -5593,19 +5570,6 @@
               </a:rPr>
               <a:t>Emmett BeAney, Jacinda Li ,Miriam Alzamily, Nana Yin, Shreya Uday</a:t>
             </a:r>
-            <a:endParaRPr kumimoji="0" lang="en-US" altLang="zh-CN" sz="1600" b="0" i="0" u="none" strike="noStrike" kern="1200" cap="none" spc="0" normalizeH="0" baseline="0" noProof="0" dirty="0">
-              <a:ln>
-                <a:noFill/>
-              </a:ln>
-              <a:solidFill>
-                <a:srgbClr val="FBDED3"/>
-              </a:solidFill>
-              <a:effectLst/>
-              <a:uLnTx/>
-              <a:uFillTx/>
-              <a:latin typeface="Arial" panose="020B0604020202020204"/>
-              <a:ea typeface="微软雅黑 Light" panose="020B0502040204020203" charset="-122"/>
-            </a:endParaRPr>
           </a:p>
         </p:txBody>
       </p:sp>
@@ -5664,20 +5628,6 @@
               </a:rPr>
               <a:t>P2-Hnefatafl </a:t>
             </a:r>
-            <a:endParaRPr kumimoji="0" lang="en-US" altLang="zh-CN" sz="8000" i="0" u="none" strike="noStrike" kern="1200" cap="none" spc="0" normalizeH="0" baseline="0" noProof="0">
-              <a:ln>
-                <a:noFill/>
-              </a:ln>
-              <a:solidFill>
-                <a:srgbClr val="FBDED3"/>
-              </a:solidFill>
-              <a:effectLst/>
-              <a:uLnTx/>
-              <a:uFillTx/>
-              <a:latin typeface="Arial" panose="020B0604020202020204"/>
-              <a:ea typeface="微软雅黑 Light" panose="020B0502040204020203" charset="-122"/>
-              <a:cs typeface="+mn-cs"/>
-            </a:endParaRPr>
           </a:p>
         </p:txBody>
       </p:sp>
@@ -5686,13 +5636,13 @@
   <p:clrMapOvr>
     <a:masterClrMapping/>
   </p:clrMapOvr>
-  <mc:AlternateContent xmlns:mc="http://schemas.openxmlformats.org/markup-compatibility/2006">
-    <mc:Choice xmlns:p14="http://schemas.microsoft.com/office/powerpoint/2010/main" Requires="p14">
+  <mc:AlternateContent xmlns:mc="http://schemas.openxmlformats.org/markup-compatibility/2006" xmlns:p14="http://schemas.microsoft.com/office/powerpoint/2010/main">
+    <mc:Choice Requires="p14">
       <p:transition spd="slow" p14:dur="1500">
         <p:random/>
       </p:transition>
     </mc:Choice>
-    <mc:Fallback>
+    <mc:Fallback xmlns="">
       <p:transition spd="slow">
         <p:random/>
       </p:transition>
@@ -5752,12 +5702,6 @@
               </a:rPr>
               <a:t>CRC Cards &amp;</a:t>
             </a:r>
-            <a:endParaRPr lang="en-US" altLang="zh-CN" sz="6000">
-              <a:solidFill>
-                <a:srgbClr val="FBDED3"/>
-              </a:solidFill>
-              <a:latin typeface="Arial" panose="020B0604020202020204"/>
-            </a:endParaRPr>
           </a:p>
           <a:p>
             <a:pPr lvl="1">
@@ -5772,12 +5716,6 @@
               </a:rPr>
               <a:t>Class Diagram</a:t>
             </a:r>
-            <a:endParaRPr lang="en-US" altLang="zh-CN" sz="6000">
-              <a:solidFill>
-                <a:srgbClr val="FBDED3"/>
-              </a:solidFill>
-              <a:latin typeface="Arial" panose="020B0604020202020204"/>
-            </a:endParaRPr>
           </a:p>
         </p:txBody>
       </p:sp>
@@ -5786,13 +5724,13 @@
   <p:clrMapOvr>
     <a:masterClrMapping/>
   </p:clrMapOvr>
-  <mc:AlternateContent xmlns:mc="http://schemas.openxmlformats.org/markup-compatibility/2006">
-    <mc:Choice xmlns:p14="http://schemas.microsoft.com/office/powerpoint/2010/main" Requires="p14">
+  <mc:AlternateContent xmlns:mc="http://schemas.openxmlformats.org/markup-compatibility/2006" xmlns:p14="http://schemas.microsoft.com/office/powerpoint/2010/main">
+    <mc:Choice Requires="p14">
       <p:transition spd="slow" p14:dur="1500">
         <p:random/>
       </p:transition>
     </mc:Choice>
-    <mc:Fallback>
+    <mc:Fallback xmlns="">
       <p:transition spd="slow">
         <p:random/>
       </p:transition>
@@ -5852,12 +5790,6 @@
               </a:rPr>
               <a:t>CRC Cards &amp;Class Diagram</a:t>
             </a:r>
-            <a:endParaRPr lang="en-US" altLang="zh-CN" sz="3200">
-              <a:solidFill>
-                <a:srgbClr val="FBDED3"/>
-              </a:solidFill>
-              <a:latin typeface="Arial" panose="020B0604020202020204"/>
-            </a:endParaRPr>
           </a:p>
         </p:txBody>
       </p:sp>
@@ -5905,30 +5837,6 @@
           <p:nvPr/>
         </p:nvPicPr>
         <p:blipFill>
-          <a:blip r:embed="rId1"/>
-          <a:stretch>
-            <a:fillRect/>
-          </a:stretch>
-        </p:blipFill>
-        <p:spPr>
-          <a:xfrm>
-            <a:off x="572770" y="951865"/>
-            <a:ext cx="3190875" cy="2310130"/>
-          </a:xfrm>
-          <a:prstGeom prst="rect">
-            <a:avLst/>
-          </a:prstGeom>
-        </p:spPr>
-      </p:pic>
-      <p:pic>
-        <p:nvPicPr>
-          <p:cNvPr id="4" name="图片 3"/>
-          <p:cNvPicPr>
-            <a:picLocks noChangeAspect="1"/>
-          </p:cNvPicPr>
-          <p:nvPr/>
-        </p:nvPicPr>
-        <p:blipFill>
           <a:blip r:embed="rId2"/>
           <a:stretch>
             <a:fillRect/>
@@ -5936,8 +5844,8 @@
         </p:blipFill>
         <p:spPr>
           <a:xfrm>
-            <a:off x="572770" y="3485515"/>
-            <a:ext cx="3190875" cy="1254760"/>
+            <a:off x="572770" y="951865"/>
+            <a:ext cx="3190875" cy="2310130"/>
           </a:xfrm>
           <a:prstGeom prst="rect">
             <a:avLst/>
@@ -5946,7 +5854,7 @@
       </p:pic>
       <p:pic>
         <p:nvPicPr>
-          <p:cNvPr id="5" name="图片 4"/>
+          <p:cNvPr id="4" name="图片 3"/>
           <p:cNvPicPr>
             <a:picLocks noChangeAspect="1"/>
           </p:cNvPicPr>
@@ -5960,8 +5868,8 @@
         </p:blipFill>
         <p:spPr>
           <a:xfrm>
-            <a:off x="4933950" y="951865"/>
-            <a:ext cx="3046095" cy="2353310"/>
+            <a:off x="572770" y="3485515"/>
+            <a:ext cx="3190875" cy="1254760"/>
           </a:xfrm>
           <a:prstGeom prst="rect">
             <a:avLst/>
@@ -5970,7 +5878,7 @@
       </p:pic>
       <p:pic>
         <p:nvPicPr>
-          <p:cNvPr id="6" name="图片 5"/>
+          <p:cNvPr id="5" name="图片 4"/>
           <p:cNvPicPr>
             <a:picLocks noChangeAspect="1"/>
           </p:cNvPicPr>
@@ -5984,6 +5892,30 @@
         </p:blipFill>
         <p:spPr>
           <a:xfrm>
+            <a:off x="4933950" y="951865"/>
+            <a:ext cx="3046095" cy="2353310"/>
+          </a:xfrm>
+          <a:prstGeom prst="rect">
+            <a:avLst/>
+          </a:prstGeom>
+        </p:spPr>
+      </p:pic>
+      <p:pic>
+        <p:nvPicPr>
+          <p:cNvPr id="6" name="图片 5"/>
+          <p:cNvPicPr>
+            <a:picLocks noChangeAspect="1"/>
+          </p:cNvPicPr>
+          <p:nvPr/>
+        </p:nvPicPr>
+        <p:blipFill>
+          <a:blip r:embed="rId5"/>
+          <a:stretch>
+            <a:fillRect/>
+          </a:stretch>
+        </p:blipFill>
+        <p:spPr>
+          <a:xfrm>
             <a:off x="4933950" y="3530600"/>
             <a:ext cx="3046095" cy="1209675"/>
           </a:xfrm>
@@ -5997,13 +5929,13 @@
   <p:clrMapOvr>
     <a:masterClrMapping/>
   </p:clrMapOvr>
-  <mc:AlternateContent xmlns:mc="http://schemas.openxmlformats.org/markup-compatibility/2006">
-    <mc:Choice xmlns:p14="http://schemas.microsoft.com/office/powerpoint/2010/main" Requires="p14">
+  <mc:AlternateContent xmlns:mc="http://schemas.openxmlformats.org/markup-compatibility/2006" xmlns:p14="http://schemas.microsoft.com/office/powerpoint/2010/main">
+    <mc:Choice Requires="p14">
       <p:transition spd="slow" p14:dur="1500">
         <p:random/>
       </p:transition>
     </mc:Choice>
-    <mc:Fallback>
+    <mc:Fallback xmlns="">
       <p:transition spd="slow">
         <p:random/>
       </p:transition>
@@ -6063,12 +5995,6 @@
               </a:rPr>
               <a:t>CRC Cards &amp;Class Diagram</a:t>
             </a:r>
-            <a:endParaRPr lang="en-US" altLang="zh-CN" sz="3200">
-              <a:solidFill>
-                <a:srgbClr val="FBDED3"/>
-              </a:solidFill>
-              <a:latin typeface="Arial" panose="020B0604020202020204"/>
-            </a:endParaRPr>
           </a:p>
         </p:txBody>
       </p:sp>
@@ -6116,30 +6042,6 @@
           <p:nvPr/>
         </p:nvPicPr>
         <p:blipFill>
-          <a:blip r:embed="rId1"/>
-          <a:stretch>
-            <a:fillRect/>
-          </a:stretch>
-        </p:blipFill>
-        <p:spPr>
-          <a:xfrm>
-            <a:off x="180975" y="824865"/>
-            <a:ext cx="3241675" cy="2752090"/>
-          </a:xfrm>
-          <a:prstGeom prst="rect">
-            <a:avLst/>
-          </a:prstGeom>
-        </p:spPr>
-      </p:pic>
-      <p:pic>
-        <p:nvPicPr>
-          <p:cNvPr id="8" name="图片 7"/>
-          <p:cNvPicPr>
-            <a:picLocks noChangeAspect="1"/>
-          </p:cNvPicPr>
-          <p:nvPr/>
-        </p:nvPicPr>
-        <p:blipFill>
           <a:blip r:embed="rId2"/>
           <a:stretch>
             <a:fillRect/>
@@ -6147,8 +6049,8 @@
         </p:blipFill>
         <p:spPr>
           <a:xfrm>
-            <a:off x="4486275" y="956945"/>
-            <a:ext cx="3629025" cy="1458595"/>
+            <a:off x="180975" y="824865"/>
+            <a:ext cx="3241675" cy="2752090"/>
           </a:xfrm>
           <a:prstGeom prst="rect">
             <a:avLst/>
@@ -6157,7 +6059,7 @@
       </p:pic>
       <p:pic>
         <p:nvPicPr>
-          <p:cNvPr id="9" name="图片 8"/>
+          <p:cNvPr id="8" name="图片 7"/>
           <p:cNvPicPr>
             <a:picLocks noChangeAspect="1"/>
           </p:cNvPicPr>
@@ -6171,6 +6073,30 @@
         </p:blipFill>
         <p:spPr>
           <a:xfrm>
+            <a:off x="4486275" y="956945"/>
+            <a:ext cx="3629025" cy="1458595"/>
+          </a:xfrm>
+          <a:prstGeom prst="rect">
+            <a:avLst/>
+          </a:prstGeom>
+        </p:spPr>
+      </p:pic>
+      <p:pic>
+        <p:nvPicPr>
+          <p:cNvPr id="9" name="图片 8"/>
+          <p:cNvPicPr>
+            <a:picLocks noChangeAspect="1"/>
+          </p:cNvPicPr>
+          <p:nvPr/>
+        </p:nvPicPr>
+        <p:blipFill>
+          <a:blip r:embed="rId4"/>
+          <a:stretch>
+            <a:fillRect/>
+          </a:stretch>
+        </p:blipFill>
+        <p:spPr>
+          <a:xfrm>
             <a:off x="4412615" y="2804795"/>
             <a:ext cx="3923665" cy="1539875"/>
           </a:xfrm>
@@ -6184,13 +6110,13 @@
   <p:clrMapOvr>
     <a:masterClrMapping/>
   </p:clrMapOvr>
-  <mc:AlternateContent xmlns:mc="http://schemas.openxmlformats.org/markup-compatibility/2006">
-    <mc:Choice xmlns:p14="http://schemas.microsoft.com/office/powerpoint/2010/main" Requires="p14">
+  <mc:AlternateContent xmlns:mc="http://schemas.openxmlformats.org/markup-compatibility/2006" xmlns:p14="http://schemas.microsoft.com/office/powerpoint/2010/main">
+    <mc:Choice Requires="p14">
       <p:transition spd="slow" p14:dur="1500">
         <p:random/>
       </p:transition>
     </mc:Choice>
-    <mc:Fallback>
+    <mc:Fallback xmlns="">
       <p:transition spd="slow">
         <p:random/>
       </p:transition>
@@ -6250,12 +6176,6 @@
               </a:rPr>
               <a:t>Traceability link matrix</a:t>
             </a:r>
-            <a:endParaRPr lang="en-US" altLang="zh-CN" sz="3200" dirty="0">
-              <a:solidFill>
-                <a:srgbClr val="FBDED3"/>
-              </a:solidFill>
-              <a:latin typeface="Arial" panose="020B0604020202020204"/>
-            </a:endParaRPr>
           </a:p>
         </p:txBody>
       </p:sp>
@@ -6303,7 +6223,7 @@
           <p:nvPr/>
         </p:nvPicPr>
         <p:blipFill>
-          <a:blip r:embed="rId1"/>
+          <a:blip r:embed="rId2"/>
           <a:stretch>
             <a:fillRect/>
           </a:stretch>
@@ -6323,13 +6243,13 @@
   <p:clrMapOvr>
     <a:masterClrMapping/>
   </p:clrMapOvr>
-  <mc:AlternateContent xmlns:mc="http://schemas.openxmlformats.org/markup-compatibility/2006">
-    <mc:Choice xmlns:p14="http://schemas.microsoft.com/office/powerpoint/2010/main" Requires="p14">
+  <mc:AlternateContent xmlns:mc="http://schemas.openxmlformats.org/markup-compatibility/2006" xmlns:p14="http://schemas.microsoft.com/office/powerpoint/2010/main">
+    <mc:Choice Requires="p14">
       <p:transition spd="slow" p14:dur="1500">
         <p:random/>
       </p:transition>
     </mc:Choice>
-    <mc:Fallback>
+    <mc:Fallback xmlns="">
       <p:transition spd="slow">
         <p:random/>
       </p:transition>
@@ -6389,12 +6309,6 @@
               </a:rPr>
               <a:t>CRC Cards &amp;Class Diagram</a:t>
             </a:r>
-            <a:endParaRPr lang="en-US" altLang="zh-CN" sz="3200">
-              <a:solidFill>
-                <a:srgbClr val="FBDED3"/>
-              </a:solidFill>
-              <a:latin typeface="Arial" panose="020B0604020202020204"/>
-            </a:endParaRPr>
           </a:p>
         </p:txBody>
       </p:sp>
@@ -6442,7 +6356,7 @@
           <p:nvPr/>
         </p:nvPicPr>
         <p:blipFill>
-          <a:blip r:embed="rId1"/>
+          <a:blip r:embed="rId2"/>
           <a:stretch>
             <a:fillRect/>
           </a:stretch>
@@ -6462,13 +6376,13 @@
   <p:clrMapOvr>
     <a:masterClrMapping/>
   </p:clrMapOvr>
-  <mc:AlternateContent xmlns:mc="http://schemas.openxmlformats.org/markup-compatibility/2006">
-    <mc:Choice xmlns:p14="http://schemas.microsoft.com/office/powerpoint/2010/main" Requires="p14">
+  <mc:AlternateContent xmlns:mc="http://schemas.openxmlformats.org/markup-compatibility/2006" xmlns:p14="http://schemas.microsoft.com/office/powerpoint/2010/main">
+    <mc:Choice Requires="p14">
       <p:transition spd="slow" p14:dur="1500">
         <p:random/>
       </p:transition>
     </mc:Choice>
-    <mc:Fallback>
+    <mc:Fallback xmlns="">
       <p:transition spd="slow">
         <p:random/>
       </p:transition>
@@ -6528,12 +6442,6 @@
               </a:rPr>
               <a:t>Kanban</a:t>
             </a:r>
-            <a:endParaRPr lang="en-US" altLang="zh-CN" sz="3200">
-              <a:solidFill>
-                <a:srgbClr val="FBDED3"/>
-              </a:solidFill>
-              <a:latin typeface="Arial" panose="020B0604020202020204"/>
-            </a:endParaRPr>
           </a:p>
         </p:txBody>
       </p:sp>
@@ -6581,7 +6489,7 @@
           <p:nvPr/>
         </p:nvPicPr>
         <p:blipFill>
-          <a:blip r:embed="rId1"/>
+          <a:blip r:embed="rId2"/>
           <a:stretch>
             <a:fillRect/>
           </a:stretch>
@@ -6601,13 +6509,13 @@
   <p:clrMapOvr>
     <a:masterClrMapping/>
   </p:clrMapOvr>
-  <mc:AlternateContent xmlns:mc="http://schemas.openxmlformats.org/markup-compatibility/2006">
-    <mc:Choice xmlns:p14="http://schemas.microsoft.com/office/powerpoint/2010/main" Requires="p14">
+  <mc:AlternateContent xmlns:mc="http://schemas.openxmlformats.org/markup-compatibility/2006" xmlns:p14="http://schemas.microsoft.com/office/powerpoint/2010/main">
+    <mc:Choice Requires="p14">
       <p:transition spd="slow" p14:dur="1500">
         <p:random/>
       </p:transition>
     </mc:Choice>
-    <mc:Fallback>
+    <mc:Fallback xmlns="">
       <p:transition spd="slow">
         <p:random/>
       </p:transition>
@@ -6671,13 +6579,6 @@
               </a:rPr>
               <a:t>Sprint Review </a:t>
             </a:r>
-            <a:endParaRPr lang="en-US" altLang="zh-CN" sz="6000" dirty="0">
-              <a:solidFill>
-                <a:srgbClr val="FBDED3"/>
-              </a:solidFill>
-              <a:latin typeface="Arial" panose="020B0604020202020204"/>
-              <a:sym typeface="+mn-ea"/>
-            </a:endParaRPr>
           </a:p>
           <a:p>
             <a:pPr lvl="0" algn="l">
@@ -6695,12 +6596,6 @@
               </a:rPr>
               <a:t>and Retrospective</a:t>
             </a:r>
-            <a:endParaRPr lang="en-US" altLang="zh-CN" sz="6000" dirty="0">
-              <a:solidFill>
-                <a:srgbClr val="FBDED3"/>
-              </a:solidFill>
-              <a:latin typeface="Arial" panose="020B0604020202020204"/>
-            </a:endParaRPr>
           </a:p>
         </p:txBody>
       </p:sp>
@@ -6709,13 +6604,13 @@
   <p:clrMapOvr>
     <a:masterClrMapping/>
   </p:clrMapOvr>
-  <mc:AlternateContent xmlns:mc="http://schemas.openxmlformats.org/markup-compatibility/2006">
-    <mc:Choice xmlns:p14="http://schemas.microsoft.com/office/powerpoint/2010/main" Requires="p14">
+  <mc:AlternateContent xmlns:mc="http://schemas.openxmlformats.org/markup-compatibility/2006" xmlns:p14="http://schemas.microsoft.com/office/powerpoint/2010/main">
+    <mc:Choice Requires="p14">
       <p:transition spd="slow" p14:dur="1500">
         <p:random/>
       </p:transition>
     </mc:Choice>
-    <mc:Fallback>
+    <mc:Fallback xmlns="">
       <p:transition spd="slow">
         <p:random/>
       </p:transition>
@@ -7027,7 +6922,6 @@
               <a:rPr lang="en-US" altLang="zh-CN" sz="2400" b="1" dirty="0"/>
               <a:t>Daily scrums:</a:t>
             </a:r>
-            <a:endParaRPr lang="en-US" altLang="zh-CN" sz="2400" b="1" dirty="0"/>
           </a:p>
           <a:p>
             <a:endParaRPr lang="en-US" altLang="zh-CN" sz="2400" b="1" dirty="0"/>
@@ -7041,7 +6935,6 @@
               <a:rPr lang="en-US" altLang="zh-CN" dirty="0"/>
               <a:t>Discussed progress</a:t>
             </a:r>
-            <a:endParaRPr lang="en-US" altLang="zh-CN" dirty="0"/>
           </a:p>
           <a:p>
             <a:pPr marL="285750" indent="-285750">
@@ -7084,7 +6977,6 @@
               <a:rPr lang="en-US" altLang="zh-CN" dirty="0"/>
               <a:t>Went over results of sprint</a:t>
             </a:r>
-            <a:endParaRPr lang="en-US" altLang="zh-CN" dirty="0"/>
           </a:p>
           <a:p>
             <a:pPr marL="285750" indent="-285750">
@@ -7095,7 +6987,6 @@
               <a:rPr lang="en-US" altLang="zh-CN" dirty="0"/>
               <a:t>Made changes as needed according to product owner</a:t>
             </a:r>
-            <a:endParaRPr lang="en-US" altLang="zh-CN" dirty="0"/>
           </a:p>
           <a:p>
             <a:pPr marL="285750" indent="-285750">
@@ -7142,11 +7033,6 @@
               </a:rPr>
               <a:t>Retrospective:</a:t>
             </a:r>
-            <a:endParaRPr lang="en-US" altLang="zh-CN" sz="2400" b="1">
-              <a:solidFill>
-                <a:srgbClr val="EEE5E6"/>
-              </a:solidFill>
-            </a:endParaRPr>
           </a:p>
           <a:p>
             <a:pPr indent="0" algn="l">
@@ -7176,11 +7062,6 @@
               </a:rPr>
               <a:t>Identified what could improve</a:t>
             </a:r>
-            <a:endParaRPr lang="en-US" altLang="zh-CN" sz="2400" b="1">
-              <a:solidFill>
-                <a:srgbClr val="EEE5E6"/>
-              </a:solidFill>
-            </a:endParaRPr>
           </a:p>
           <a:p>
             <a:pPr indent="0" algn="l">
@@ -7210,11 +7091,6 @@
               </a:rPr>
               <a:t>Identified what went well</a:t>
             </a:r>
-            <a:endParaRPr lang="en-US" altLang="zh-CN" sz="2400" b="1">
-              <a:solidFill>
-                <a:srgbClr val="EEE5E6"/>
-              </a:solidFill>
-            </a:endParaRPr>
           </a:p>
         </p:txBody>
       </p:sp>
@@ -7223,13 +7099,13 @@
   <p:clrMapOvr>
     <a:masterClrMapping/>
   </p:clrMapOvr>
-  <mc:AlternateContent xmlns:mc="http://schemas.openxmlformats.org/markup-compatibility/2006">
-    <mc:Choice xmlns:p14="http://schemas.microsoft.com/office/powerpoint/2010/main" Requires="p14">
+  <mc:AlternateContent xmlns:mc="http://schemas.openxmlformats.org/markup-compatibility/2006" xmlns:p14="http://schemas.microsoft.com/office/powerpoint/2010/main">
+    <mc:Choice Requires="p14">
       <p:transition spd="slow" p14:dur="1500">
         <p:random/>
       </p:transition>
     </mc:Choice>
-    <mc:Fallback>
+    <mc:Fallback xmlns="">
       <p:transition spd="slow">
         <p:random/>
       </p:transition>
@@ -7505,11 +7381,6 @@
               </a:rPr>
               <a:t>10/11-During this scrum, we discussed the file content of P2 together and allocated the files within the file.</a:t>
             </a:r>
-            <a:endParaRPr lang="en-US" altLang="zh-CN" sz="2000" b="1" dirty="0">
-              <a:solidFill>
-                <a:srgbClr val="EEE5E6"/>
-              </a:solidFill>
-            </a:endParaRPr>
           </a:p>
           <a:p>
             <a:pPr indent="0" algn="l">
@@ -7539,11 +7410,6 @@
               </a:rPr>
               <a:t>10/21-During this scrum, we asked the professor about the parts of the P1 document that could be improved. The task of file improvement was assigned.</a:t>
             </a:r>
-            <a:endParaRPr lang="en-US" altLang="zh-CN" sz="2000" b="1" dirty="0">
-              <a:solidFill>
-                <a:srgbClr val="EEE5E6"/>
-              </a:solidFill>
-            </a:endParaRPr>
           </a:p>
           <a:p>
             <a:pPr indent="0" algn="l">
@@ -7573,11 +7439,6 @@
               </a:rPr>
               <a:t>10/24-During this scrum, we solved the game's implementation of the code logic for the round, assigned code tasks based on the improved task and each person's familiar direction, and worked out the deadline.</a:t>
             </a:r>
-            <a:endParaRPr lang="en-US" altLang="zh-CN" sz="2000" b="1" dirty="0">
-              <a:solidFill>
-                <a:srgbClr val="EEE5E6"/>
-              </a:solidFill>
-            </a:endParaRPr>
           </a:p>
           <a:p>
             <a:pPr indent="0" algn="l">
@@ -7608,12 +7469,6 @@
               </a:rPr>
               <a:t>10/31-During this scrum,  we integrated the code into a project.</a:t>
             </a:r>
-            <a:endParaRPr lang="en-US" altLang="zh-CN" sz="2000" b="1" dirty="0">
-              <a:solidFill>
-                <a:srgbClr val="EEE5E6"/>
-              </a:solidFill>
-              <a:sym typeface="+mn-ea"/>
-            </a:endParaRPr>
           </a:p>
           <a:p>
             <a:pPr indent="0" algn="l">
@@ -7648,13 +7503,13 @@
   <p:clrMapOvr>
     <a:masterClrMapping/>
   </p:clrMapOvr>
-  <mc:AlternateContent xmlns:mc="http://schemas.openxmlformats.org/markup-compatibility/2006">
-    <mc:Choice xmlns:p14="http://schemas.microsoft.com/office/powerpoint/2010/main" Requires="p14">
+  <mc:AlternateContent xmlns:mc="http://schemas.openxmlformats.org/markup-compatibility/2006" xmlns:p14="http://schemas.microsoft.com/office/powerpoint/2010/main">
+    <mc:Choice Requires="p14">
       <p:transition spd="slow" p14:dur="1500">
         <p:random/>
       </p:transition>
     </mc:Choice>
-    <mc:Fallback>
+    <mc:Fallback xmlns="">
       <p:transition spd="slow">
         <p:random/>
       </p:transition>
@@ -7931,12 +7786,6 @@
               </a:rPr>
               <a:t>What went well:</a:t>
             </a:r>
-            <a:endParaRPr lang="en-US" altLang="zh-CN" sz="2000" b="1" dirty="0">
-              <a:solidFill>
-                <a:srgbClr val="EEE5E6"/>
-              </a:solidFill>
-              <a:sym typeface="+mn-ea"/>
-            </a:endParaRPr>
           </a:p>
           <a:p>
             <a:pPr indent="0" algn="l">
@@ -7954,12 +7803,6 @@
               </a:rPr>
               <a:t>Our scrum meetings discussed a lot of details about the implementation of the game, actively assigning tasks, making plans for each week and the next meeting time.</a:t>
             </a:r>
-            <a:endParaRPr lang="en-US" altLang="zh-CN" sz="2000" b="1" dirty="0">
-              <a:solidFill>
-                <a:srgbClr val="EEE5E6"/>
-              </a:solidFill>
-              <a:sym typeface="+mn-ea"/>
-            </a:endParaRPr>
           </a:p>
           <a:p>
             <a:pPr indent="0" algn="l">
@@ -7991,12 +7834,6 @@
               </a:rPr>
               <a:t>What could improve:</a:t>
             </a:r>
-            <a:endParaRPr lang="en-US" altLang="zh-CN" sz="2000" b="1" dirty="0">
-              <a:solidFill>
-                <a:srgbClr val="EEE5E6"/>
-              </a:solidFill>
-              <a:sym typeface="+mn-ea"/>
-            </a:endParaRPr>
           </a:p>
           <a:p>
             <a:pPr indent="0" algn="l">
@@ -8014,12 +7851,6 @@
               </a:rPr>
               <a:t>1.The task should smaller and clearer, avoiding two people spending time on similar functionality</a:t>
             </a:r>
-            <a:endParaRPr lang="en-US" altLang="zh-CN" sz="2000" b="1" dirty="0">
-              <a:solidFill>
-                <a:srgbClr val="EEE5E6"/>
-              </a:solidFill>
-              <a:sym typeface="+mn-ea"/>
-            </a:endParaRPr>
           </a:p>
           <a:p>
             <a:pPr indent="0" algn="l">
@@ -8037,12 +7868,6 @@
               </a:rPr>
               <a:t>2. Need more effective communication during our team meeting</a:t>
             </a:r>
-            <a:endParaRPr lang="en-US" altLang="zh-CN" sz="2000" b="1" dirty="0">
-              <a:solidFill>
-                <a:srgbClr val="EEE5E6"/>
-              </a:solidFill>
-              <a:sym typeface="+mn-ea"/>
-            </a:endParaRPr>
           </a:p>
           <a:p>
             <a:pPr indent="0" algn="l">
@@ -8060,12 +7885,6 @@
               </a:rPr>
               <a:t>3. Everyone must abide by agreed upon deadlines and deliver the outcomes on time.</a:t>
             </a:r>
-            <a:endParaRPr lang="en-US" altLang="zh-CN" sz="2000" b="1" dirty="0">
-              <a:solidFill>
-                <a:srgbClr val="EEE5E6"/>
-              </a:solidFill>
-              <a:sym typeface="+mn-ea"/>
-            </a:endParaRPr>
           </a:p>
           <a:p>
             <a:pPr indent="0" algn="l">
@@ -8083,12 +7902,6 @@
               </a:rPr>
               <a:t>4. Have more meetings with the PO</a:t>
             </a:r>
-            <a:endParaRPr lang="en-US" altLang="zh-CN" sz="2000" b="1" dirty="0">
-              <a:solidFill>
-                <a:srgbClr val="EEE5E6"/>
-              </a:solidFill>
-              <a:sym typeface="+mn-ea"/>
-            </a:endParaRPr>
           </a:p>
           <a:p>
             <a:pPr indent="0" algn="l">
@@ -8123,13 +7936,13 @@
   <p:clrMapOvr>
     <a:masterClrMapping/>
   </p:clrMapOvr>
-  <mc:AlternateContent xmlns:mc="http://schemas.openxmlformats.org/markup-compatibility/2006">
-    <mc:Choice xmlns:p14="http://schemas.microsoft.com/office/powerpoint/2010/main" Requires="p14">
+  <mc:AlternateContent xmlns:mc="http://schemas.openxmlformats.org/markup-compatibility/2006" xmlns:p14="http://schemas.microsoft.com/office/powerpoint/2010/main">
+    <mc:Choice Requires="p14">
       <p:transition spd="slow" p14:dur="1500">
         <p:random/>
       </p:transition>
     </mc:Choice>
-    <mc:Fallback>
+    <mc:Fallback xmlns="">
       <p:transition spd="slow">
         <p:random/>
       </p:transition>
@@ -8224,12 +8037,6 @@
               </a:rPr>
               <a:t>The perfection of documents  </a:t>
             </a:r>
-            <a:endParaRPr lang="en-US" altLang="zh-CN">
-              <a:solidFill>
-                <a:srgbClr val="FBDED3"/>
-              </a:solidFill>
-              <a:latin typeface="Arial" panose="020B0604020202020204"/>
-            </a:endParaRPr>
           </a:p>
         </p:txBody>
       </p:sp>
@@ -8265,13 +8072,6 @@
               </a:rPr>
               <a:t>Picture Source: the picture from the network.  https://zhuanlan.zhihu.com/p/33300643</a:t>
             </a:r>
-            <a:endParaRPr lang="en-US" altLang="zh-CN">
-              <a:solidFill>
-                <a:schemeClr val="bg1">
-                  <a:lumMod val="65000"/>
-                </a:schemeClr>
-              </a:solidFill>
-            </a:endParaRPr>
           </a:p>
         </p:txBody>
       </p:sp>
@@ -8305,6 +8105,8 @@
               </a:rPr>
               <a:t>1. User stories</a:t>
             </a:r>
+          </a:p>
+          <a:p>
             <a:endParaRPr lang="en-US" altLang="zh-CN" sz="2400" b="1">
               <a:solidFill>
                 <a:srgbClr val="FBDED3"/>
@@ -8312,6 +8114,16 @@
             </a:endParaRPr>
           </a:p>
           <a:p>
+            <a:r>
+              <a:rPr lang="en-US" altLang="zh-CN" sz="2400" b="1">
+                <a:solidFill>
+                  <a:srgbClr val="FBDED3"/>
+                </a:solidFill>
+              </a:rPr>
+              <a:t>2.CRC card &amp; class diagram</a:t>
+            </a:r>
+          </a:p>
+          <a:p>
             <a:endParaRPr lang="en-US" altLang="zh-CN" sz="2400" b="1">
               <a:solidFill>
                 <a:srgbClr val="FBDED3"/>
@@ -8325,8 +8137,10 @@
                   <a:srgbClr val="FBDED3"/>
                 </a:solidFill>
               </a:rPr>
-              <a:t>2.CRC card &amp; class diagram</a:t>
-            </a:r>
+              <a:t>3.Acceptance Criteria</a:t>
+            </a:r>
+          </a:p>
+          <a:p>
             <a:endParaRPr lang="en-US" altLang="zh-CN" sz="2400" b="1">
               <a:solidFill>
                 <a:srgbClr val="FBDED3"/>
@@ -8334,6 +8148,16 @@
             </a:endParaRPr>
           </a:p>
           <a:p>
+            <a:r>
+              <a:rPr lang="en-US" altLang="zh-CN" sz="2400" b="1">
+                <a:solidFill>
+                  <a:srgbClr val="FBDED3"/>
+                </a:solidFill>
+              </a:rPr>
+              <a:t>4. Task for User stories</a:t>
+            </a:r>
+          </a:p>
+          <a:p>
             <a:endParaRPr lang="en-US" altLang="zh-CN" sz="2400" b="1">
               <a:solidFill>
                 <a:srgbClr val="FBDED3"/>
@@ -8347,57 +8171,8 @@
                   <a:srgbClr val="FBDED3"/>
                 </a:solidFill>
               </a:rPr>
-              <a:t>3.Acceptance Criteria</a:t>
-            </a:r>
-            <a:endParaRPr lang="en-US" altLang="zh-CN" sz="2400" b="1">
-              <a:solidFill>
-                <a:srgbClr val="FBDED3"/>
-              </a:solidFill>
-            </a:endParaRPr>
-          </a:p>
-          <a:p>
-            <a:endParaRPr lang="en-US" altLang="zh-CN" sz="2400" b="1">
-              <a:solidFill>
-                <a:srgbClr val="FBDED3"/>
-              </a:solidFill>
-            </a:endParaRPr>
-          </a:p>
-          <a:p>
-            <a:r>
-              <a:rPr lang="en-US" altLang="zh-CN" sz="2400" b="1">
-                <a:solidFill>
-                  <a:srgbClr val="FBDED3"/>
-                </a:solidFill>
-              </a:rPr>
-              <a:t>4. Task for User stories</a:t>
-            </a:r>
-            <a:endParaRPr lang="en-US" altLang="zh-CN" sz="2400" b="1">
-              <a:solidFill>
-                <a:srgbClr val="FBDED3"/>
-              </a:solidFill>
-            </a:endParaRPr>
-          </a:p>
-          <a:p>
-            <a:endParaRPr lang="en-US" altLang="zh-CN" sz="2400" b="1">
-              <a:solidFill>
-                <a:srgbClr val="FBDED3"/>
-              </a:solidFill>
-            </a:endParaRPr>
-          </a:p>
-          <a:p>
-            <a:r>
-              <a:rPr lang="en-US" altLang="zh-CN" sz="2400" b="1">
-                <a:solidFill>
-                  <a:srgbClr val="FBDED3"/>
-                </a:solidFill>
-              </a:rPr>
               <a:t>5. Development Manual</a:t>
             </a:r>
-            <a:endParaRPr lang="en-US" altLang="zh-CN" sz="2400" b="1">
-              <a:solidFill>
-                <a:srgbClr val="FBDED3"/>
-              </a:solidFill>
-            </a:endParaRPr>
           </a:p>
         </p:txBody>
       </p:sp>
@@ -8406,13 +8181,13 @@
   <p:clrMapOvr>
     <a:masterClrMapping/>
   </p:clrMapOvr>
-  <mc:AlternateContent xmlns:mc="http://schemas.openxmlformats.org/markup-compatibility/2006">
-    <mc:Choice xmlns:p14="http://schemas.microsoft.com/office/powerpoint/2010/main" Requires="p14">
+  <mc:AlternateContent xmlns:mc="http://schemas.openxmlformats.org/markup-compatibility/2006" xmlns:p14="http://schemas.microsoft.com/office/powerpoint/2010/main">
+    <mc:Choice Requires="p14">
       <p:transition spd="slow" p14:dur="1500">
         <p:random/>
       </p:transition>
     </mc:Choice>
-    <mc:Fallback>
+    <mc:Fallback xmlns="">
       <p:transition spd="slow">
         <p:random/>
       </p:transition>
@@ -8471,12 +8246,6 @@
               </a:rPr>
               <a:t>DEMO</a:t>
             </a:r>
-            <a:endParaRPr lang="en-US" altLang="zh-CN" sz="6000" dirty="0">
-              <a:solidFill>
-                <a:srgbClr val="FBDED3"/>
-              </a:solidFill>
-              <a:latin typeface="Arial" panose="020B0604020202020204"/>
-            </a:endParaRPr>
           </a:p>
         </p:txBody>
       </p:sp>
@@ -8485,13 +8254,13 @@
   <p:clrMapOvr>
     <a:masterClrMapping/>
   </p:clrMapOvr>
-  <mc:AlternateContent xmlns:mc="http://schemas.openxmlformats.org/markup-compatibility/2006">
-    <mc:Choice xmlns:p14="http://schemas.microsoft.com/office/powerpoint/2010/main" Requires="p14">
+  <mc:AlternateContent xmlns:mc="http://schemas.openxmlformats.org/markup-compatibility/2006" xmlns:p14="http://schemas.microsoft.com/office/powerpoint/2010/main">
+    <mc:Choice Requires="p14">
       <p:transition spd="slow" p14:dur="1500">
         <p:random/>
       </p:transition>
     </mc:Choice>
-    <mc:Fallback>
+    <mc:Fallback xmlns="">
       <p:transition spd="slow">
         <p:random/>
       </p:transition>
@@ -8594,13 +8363,13 @@
   <p:clrMapOvr>
     <a:masterClrMapping/>
   </p:clrMapOvr>
-  <mc:AlternateContent xmlns:mc="http://schemas.openxmlformats.org/markup-compatibility/2006">
-    <mc:Choice xmlns:p14="http://schemas.microsoft.com/office/powerpoint/2010/main" Requires="p14">
+  <mc:AlternateContent xmlns:mc="http://schemas.openxmlformats.org/markup-compatibility/2006" xmlns:p14="http://schemas.microsoft.com/office/powerpoint/2010/main">
+    <mc:Choice Requires="p14">
       <p:transition spd="slow" p14:dur="1500">
         <p:random/>
       </p:transition>
     </mc:Choice>
-    <mc:Fallback>
+    <mc:Fallback xmlns="">
       <p:transition spd="slow">
         <p:random/>
       </p:transition>
@@ -8702,9 +8471,6 @@
               </a:rPr>
               <a:t>1. As a user, I want to register to this platform by using an email, nickname and a password.</a:t>
             </a:r>
-            <a:endParaRPr lang="en-US" sz="2000" b="1" dirty="0">
-              <a:sym typeface="+mn-ea"/>
-            </a:endParaRPr>
           </a:p>
           <a:p>
             <a:pPr marL="0" indent="0">
@@ -8722,9 +8488,6 @@
               </a:rPr>
               <a:t>2. As a user, I want to login to this platform using the account I registered.</a:t>
             </a:r>
-            <a:endParaRPr lang="en-US" sz="2000" b="1" dirty="0">
-              <a:sym typeface="+mn-ea"/>
-            </a:endParaRPr>
           </a:p>
           <a:p>
             <a:pPr marL="0" indent="0">
@@ -8754,9 +8517,6 @@
               </a:rPr>
               <a:t>.</a:t>
             </a:r>
-            <a:endParaRPr lang="en-US" sz="2000" b="1" dirty="0">
-              <a:sym typeface="+mn-ea"/>
-            </a:endParaRPr>
           </a:p>
           <a:p>
             <a:pPr marL="0" indent="0">
@@ -8774,9 +8534,6 @@
               </a:rPr>
               <a:t>4. As a user, I want to know when it is my turn.</a:t>
             </a:r>
-            <a:endParaRPr lang="en-US" sz="2000" b="1" dirty="0">
-              <a:sym typeface="+mn-ea"/>
-            </a:endParaRPr>
           </a:p>
           <a:p>
             <a:pPr marL="0" indent="0">
@@ -8982,14 +8739,6 @@
               </a:rPr>
               <a:t>User Stories</a:t>
             </a:r>
-            <a:endParaRPr lang="en-US" altLang="zh-CN" sz="2400">
-              <a:solidFill>
-                <a:srgbClr val="FBDED3"/>
-              </a:solidFill>
-              <a:latin typeface="+mj-lt"/>
-              <a:ea typeface="+mj-ea"/>
-              <a:sym typeface="Calibri" panose="020F0502020204030204" pitchFamily="34" charset="0"/>
-            </a:endParaRPr>
           </a:p>
         </p:txBody>
       </p:sp>
@@ -9037,7 +8786,7 @@
           <p:nvPr/>
         </p:nvPicPr>
         <p:blipFill rotWithShape="1">
-          <a:blip r:embed="rId1" cstate="print">
+          <a:blip r:embed="rId2" cstate="print">
             <a:extLst>
               <a:ext uri="{28A0092B-C50C-407E-A947-70E740481C1C}">
                 <a14:useLocalDpi xmlns:a14="http://schemas.microsoft.com/office/drawing/2010/main" val="0"/>
@@ -9064,13 +8813,13 @@
   <p:clrMapOvr>
     <a:masterClrMapping/>
   </p:clrMapOvr>
-  <mc:AlternateContent xmlns:mc="http://schemas.openxmlformats.org/markup-compatibility/2006">
-    <mc:Choice xmlns:p14="http://schemas.microsoft.com/office/powerpoint/2010/main" Requires="p14">
+  <mc:AlternateContent xmlns:mc="http://schemas.openxmlformats.org/markup-compatibility/2006" xmlns:p14="http://schemas.microsoft.com/office/powerpoint/2010/main">
+    <mc:Choice Requires="p14">
       <p:transition spd="slow" p14:dur="1500">
         <p:random/>
       </p:transition>
     </mc:Choice>
-    <mc:Fallback>
+    <mc:Fallback xmlns="">
       <p:transition spd="slow">
         <p:random/>
       </p:transition>
@@ -9399,12 +9148,6 @@
               </a:rPr>
               <a:t>()</a:t>
             </a:r>
-            <a:endParaRPr lang="en-US" sz="2400" dirty="0">
-              <a:solidFill>
-                <a:srgbClr val="FBDED3"/>
-              </a:solidFill>
-              <a:sym typeface="+mn-ea"/>
-            </a:endParaRPr>
           </a:p>
           <a:p>
             <a:pPr lvl="1" algn="l"/>
@@ -9461,12 +9204,6 @@
               </a:rPr>
               <a:t>int move() </a:t>
             </a:r>
-            <a:endParaRPr lang="en-US" sz="2400" dirty="0">
-              <a:solidFill>
-                <a:srgbClr val="FBDED3"/>
-              </a:solidFill>
-              <a:sym typeface="+mn-ea"/>
-            </a:endParaRPr>
           </a:p>
           <a:p>
             <a:pPr lvl="1" algn="l"/>
@@ -9497,12 +9234,6 @@
               </a:rPr>
               <a:t>()</a:t>
             </a:r>
-            <a:endParaRPr lang="en-US" sz="2400" dirty="0">
-              <a:solidFill>
-                <a:srgbClr val="FBDED3"/>
-              </a:solidFill>
-              <a:sym typeface="+mn-ea"/>
-            </a:endParaRPr>
           </a:p>
           <a:p>
             <a:pPr lvl="1" algn="l"/>
@@ -9718,13 +9449,13 @@
   <p:clrMapOvr>
     <a:masterClrMapping/>
   </p:clrMapOvr>
-  <mc:AlternateContent xmlns:mc="http://schemas.openxmlformats.org/markup-compatibility/2006">
-    <mc:Choice xmlns:p14="http://schemas.microsoft.com/office/powerpoint/2010/main" Requires="p14">
+  <mc:AlternateContent xmlns:mc="http://schemas.openxmlformats.org/markup-compatibility/2006" xmlns:p14="http://schemas.microsoft.com/office/powerpoint/2010/main">
+    <mc:Choice Requires="p14">
       <p:transition spd="slow" p14:dur="1500">
         <p:random/>
       </p:transition>
     </mc:Choice>
-    <mc:Fallback>
+    <mc:Fallback xmlns="">
       <p:transition spd="slow">
         <p:random/>
       </p:transition>
@@ -9828,12 +9559,6 @@
               </a:rPr>
               <a:t>  </a:t>
             </a:r>
-            <a:endParaRPr lang="en-US" altLang="zh-CN">
-              <a:solidFill>
-                <a:srgbClr val="FBDED3"/>
-              </a:solidFill>
-              <a:latin typeface="Arial" panose="020B0604020202020204"/>
-            </a:endParaRPr>
           </a:p>
         </p:txBody>
       </p:sp>
@@ -9845,8 +9570,8 @@
         </p:nvSpPr>
         <p:spPr>
           <a:xfrm>
-            <a:off x="889635" y="1003935"/>
-            <a:ext cx="7583170" cy="4154170"/>
+            <a:off x="102600" y="737976"/>
+            <a:ext cx="8620017" cy="3600986"/>
           </a:xfrm>
           <a:prstGeom prst="rect">
             <a:avLst/>
@@ -9860,7 +9585,7 @@
           <a:lstStyle/>
           <a:p>
             <a:r>
-              <a:rPr lang="en-US" altLang="zh-CN" sz="2400" b="1" dirty="0">
+              <a:rPr lang="en-US" altLang="zh-CN" sz="2000" b="1" dirty="0">
                 <a:solidFill>
                   <a:srgbClr val="FBDED3"/>
                 </a:solidFill>
@@ -9868,7 +9593,7 @@
               <a:t>·As a user, I want to be able to play </a:t>
             </a:r>
             <a:r>
-              <a:rPr lang="en-US" altLang="zh-CN" sz="2400" b="1" dirty="0" err="1">
+              <a:rPr lang="en-US" altLang="zh-CN" sz="2000" b="1" dirty="0" err="1">
                 <a:solidFill>
                   <a:srgbClr val="FBDED3"/>
                 </a:solidFill>
@@ -9876,13 +9601,100 @@
               <a:t>Hnefatafl</a:t>
             </a:r>
             <a:r>
-              <a:rPr lang="en-US" altLang="zh-CN" sz="2400" b="1" dirty="0">
+              <a:rPr lang="en-US" altLang="zh-CN" sz="2000" b="1" dirty="0">
                 <a:solidFill>
                   <a:srgbClr val="FBDED3"/>
                 </a:solidFill>
               </a:rPr>
-              <a:t>. </a:t>
-            </a:r>
+              <a:t>. 	</a:t>
+            </a:r>
+            <a:r>
+              <a:rPr lang="en-US" altLang="zh-CN" sz="2000" b="1" dirty="0">
+                <a:solidFill>
+                  <a:srgbClr val="00B050"/>
+                </a:solidFill>
+              </a:rPr>
+              <a:t>(Backend function finished)</a:t>
+            </a:r>
+          </a:p>
+          <a:p>
+            <a:r>
+              <a:rPr lang="en-US" altLang="zh-CN" sz="2000" b="1" dirty="0">
+                <a:solidFill>
+                  <a:srgbClr val="FBDED3"/>
+                </a:solidFill>
+              </a:rPr>
+              <a:t>Priority:1 </a:t>
+            </a:r>
+          </a:p>
+          <a:p>
+            <a:endParaRPr lang="en-US" altLang="zh-CN" sz="2000" b="1" dirty="0">
+              <a:solidFill>
+                <a:srgbClr val="FBDED3"/>
+              </a:solidFill>
+            </a:endParaRPr>
+          </a:p>
+          <a:p>
+            <a:r>
+              <a:rPr lang="en-US" altLang="zh-CN" sz="2000" b="1" dirty="0">
+                <a:solidFill>
+                  <a:srgbClr val="FBDED3"/>
+                </a:solidFill>
+              </a:rPr>
+              <a:t>Task: </a:t>
+            </a:r>
+          </a:p>
+          <a:p>
+            <a:r>
+              <a:rPr lang="en-US" altLang="zh-CN" sz="2000" b="1" dirty="0">
+                <a:solidFill>
+                  <a:srgbClr val="FBDED3"/>
+                </a:solidFill>
+              </a:rPr>
+              <a:t>1.Implement ability to display basic game screen to the user </a:t>
+            </a:r>
+          </a:p>
+          <a:p>
+            <a:r>
+              <a:rPr lang="en-US" altLang="zh-CN" sz="2000" b="1" dirty="0">
+                <a:solidFill>
+                  <a:srgbClr val="FBDED3"/>
+                </a:solidFill>
+              </a:rPr>
+              <a:t>2.Write code to achieve chess movement</a:t>
+            </a:r>
+          </a:p>
+          <a:p>
+            <a:r>
+              <a:rPr lang="en-US" altLang="zh-CN" sz="2000" b="1" dirty="0">
+                <a:solidFill>
+                  <a:srgbClr val="FBDED3"/>
+                </a:solidFill>
+              </a:rPr>
+              <a:t>3.Write code to achieve the pieces capturing the opponent’s pieces</a:t>
+            </a:r>
+          </a:p>
+          <a:p>
+            <a:r>
+              <a:rPr lang="en-US" altLang="zh-CN" sz="2000" b="1" dirty="0">
+                <a:solidFill>
+                  <a:srgbClr val="FBDED3"/>
+                </a:solidFill>
+              </a:rPr>
+              <a:t>4.Write code to update game screen</a:t>
+            </a:r>
+          </a:p>
+          <a:p>
+            <a:r>
+              <a:rPr lang="en-US" altLang="zh-CN" sz="2000" b="1" dirty="0">
+                <a:solidFill>
+                  <a:srgbClr val="FBDED3"/>
+                </a:solidFill>
+              </a:rPr>
+              <a:t>5.Write code to add the logout button</a:t>
+            </a:r>
+          </a:p>
+          <a:p>
             <a:endParaRPr lang="en-US" altLang="zh-CN" sz="2400" b="1" dirty="0">
               <a:solidFill>
                 <a:srgbClr val="FBDED3"/>
@@ -9890,124 +9702,12 @@
             </a:endParaRPr>
           </a:p>
           <a:p>
-            <a:r>
-              <a:rPr lang="en-US" altLang="zh-CN" sz="2400" b="1" dirty="0">
-                <a:solidFill>
-                  <a:srgbClr val="FBDED3"/>
-                </a:solidFill>
-              </a:rPr>
-              <a:t>Priority:1 </a:t>
-            </a:r>
             <a:endParaRPr lang="en-US" altLang="zh-CN" sz="2400" b="1" dirty="0">
               <a:solidFill>
                 <a:srgbClr val="FBDED3"/>
               </a:solidFill>
             </a:endParaRPr>
           </a:p>
-          <a:p>
-            <a:r>
-              <a:rPr lang="en-US" altLang="zh-CN" sz="2400" b="1" dirty="0">
-                <a:solidFill>
-                  <a:srgbClr val="FBDED3"/>
-                </a:solidFill>
-              </a:rPr>
-              <a:t>Task: </a:t>
-            </a:r>
-            <a:endParaRPr lang="en-US" altLang="zh-CN" sz="2400" b="1" dirty="0">
-              <a:solidFill>
-                <a:srgbClr val="FBDED3"/>
-              </a:solidFill>
-            </a:endParaRPr>
-          </a:p>
-          <a:p>
-            <a:r>
-              <a:rPr lang="en-US" altLang="zh-CN" sz="2400" b="1" dirty="0">
-                <a:solidFill>
-                  <a:srgbClr val="FBDED3"/>
-                </a:solidFill>
-              </a:rPr>
-              <a:t>1.Implement ability to display basic game screen to the user </a:t>
-            </a:r>
-            <a:endParaRPr lang="en-US" altLang="zh-CN" sz="2400" b="1" dirty="0">
-              <a:solidFill>
-                <a:srgbClr val="FBDED3"/>
-              </a:solidFill>
-            </a:endParaRPr>
-          </a:p>
-          <a:p>
-            <a:r>
-              <a:rPr lang="en-US" altLang="zh-CN" sz="2400" b="1" dirty="0">
-                <a:solidFill>
-                  <a:srgbClr val="FBDED3"/>
-                </a:solidFill>
-              </a:rPr>
-              <a:t>2.Write code to achieve chess movement</a:t>
-            </a:r>
-            <a:endParaRPr lang="en-US" altLang="zh-CN" sz="2400" b="1" dirty="0">
-              <a:solidFill>
-                <a:srgbClr val="FBDED3"/>
-              </a:solidFill>
-            </a:endParaRPr>
-          </a:p>
-          <a:p>
-            <a:r>
-              <a:rPr lang="en-US" altLang="zh-CN" sz="2400" b="1" dirty="0">
-                <a:solidFill>
-                  <a:srgbClr val="FBDED3"/>
-                </a:solidFill>
-              </a:rPr>
-              <a:t>3.Write code to achieve the pieces capturing the opponent’s pieces</a:t>
-            </a:r>
-            <a:endParaRPr lang="en-US" altLang="zh-CN" sz="2400" b="1" dirty="0">
-              <a:solidFill>
-                <a:srgbClr val="FBDED3"/>
-              </a:solidFill>
-            </a:endParaRPr>
-          </a:p>
-          <a:p>
-            <a:r>
-              <a:rPr lang="en-US" altLang="zh-CN" sz="2400" b="1" dirty="0">
-                <a:solidFill>
-                  <a:srgbClr val="FBDED3"/>
-                </a:solidFill>
-              </a:rPr>
-              <a:t>4.Write code to update game screen</a:t>
-            </a:r>
-            <a:endParaRPr lang="en-US" altLang="zh-CN" sz="2400" b="1" dirty="0">
-              <a:solidFill>
-                <a:srgbClr val="FBDED3"/>
-              </a:solidFill>
-            </a:endParaRPr>
-          </a:p>
-          <a:p>
-            <a:r>
-              <a:rPr lang="en-US" altLang="zh-CN" sz="2400" b="1" dirty="0">
-                <a:solidFill>
-                  <a:srgbClr val="FBDED3"/>
-                </a:solidFill>
-              </a:rPr>
-              <a:t>5.Write code to add the logout button</a:t>
-            </a:r>
-            <a:endParaRPr lang="en-US" altLang="zh-CN" sz="2400" b="1" dirty="0">
-              <a:solidFill>
-                <a:srgbClr val="FBDED3"/>
-              </a:solidFill>
-            </a:endParaRPr>
-          </a:p>
-          <a:p>
-            <a:endParaRPr lang="en-US" altLang="zh-CN" sz="2400" b="1" dirty="0">
-              <a:solidFill>
-                <a:srgbClr val="FBDED3"/>
-              </a:solidFill>
-            </a:endParaRPr>
-          </a:p>
-          <a:p>
-            <a:endParaRPr lang="en-US" altLang="zh-CN" sz="2400" b="1" dirty="0">
-              <a:solidFill>
-                <a:srgbClr val="FBDED3"/>
-              </a:solidFill>
-            </a:endParaRPr>
-          </a:p>
         </p:txBody>
       </p:sp>
     </p:spTree>
@@ -10015,13 +9715,13 @@
   <p:clrMapOvr>
     <a:masterClrMapping/>
   </p:clrMapOvr>
-  <mc:AlternateContent xmlns:mc="http://schemas.openxmlformats.org/markup-compatibility/2006">
-    <mc:Choice xmlns:p14="http://schemas.microsoft.com/office/powerpoint/2010/main" Requires="p14">
+  <mc:AlternateContent xmlns:mc="http://schemas.openxmlformats.org/markup-compatibility/2006" xmlns:p14="http://schemas.microsoft.com/office/powerpoint/2010/main">
+    <mc:Choice Requires="p14">
       <p:transition spd="slow" p14:dur="1500">
         <p:random/>
       </p:transition>
     </mc:Choice>
-    <mc:Fallback>
+    <mc:Fallback xmlns="">
       <p:transition spd="slow">
         <p:random/>
       </p:transition>
@@ -10125,12 +9825,6 @@
               </a:rPr>
               <a:t>  </a:t>
             </a:r>
-            <a:endParaRPr lang="en-US" altLang="zh-CN">
-              <a:solidFill>
-                <a:srgbClr val="FBDED3"/>
-              </a:solidFill>
-              <a:latin typeface="Arial" panose="020B0604020202020204"/>
-            </a:endParaRPr>
           </a:p>
         </p:txBody>
       </p:sp>
@@ -10143,7 +9837,7 @@
         <p:spPr>
           <a:xfrm>
             <a:off x="1043940" y="1278890"/>
-            <a:ext cx="7583170" cy="2308324"/>
+            <a:ext cx="7583170" cy="2677656"/>
           </a:xfrm>
           <a:prstGeom prst="rect">
             <a:avLst/>
@@ -10165,6 +9859,33 @@
               </a:rPr>
               <a:t>• As a user, I want to know when it is my turn. </a:t>
             </a:r>
+            <a:r>
+              <a:rPr lang="en-US" altLang="zh-CN" sz="2400" b="1" dirty="0">
+                <a:solidFill>
+                  <a:srgbClr val="00B050"/>
+                </a:solidFill>
+                <a:sym typeface="+mn-ea"/>
+              </a:rPr>
+              <a:t>(Finished)</a:t>
+            </a:r>
+            <a:endParaRPr lang="en-US" altLang="zh-CN" sz="2400" b="1" dirty="0">
+              <a:solidFill>
+                <a:srgbClr val="00B050"/>
+              </a:solidFill>
+            </a:endParaRPr>
+          </a:p>
+          <a:p>
+            <a:r>
+              <a:rPr lang="en-US" altLang="zh-CN" sz="2400" b="1" dirty="0">
+                <a:solidFill>
+                  <a:srgbClr val="FBDED3"/>
+                </a:solidFill>
+                <a:sym typeface="+mn-ea"/>
+              </a:rPr>
+              <a:t>Priority:2 </a:t>
+            </a:r>
+          </a:p>
+          <a:p>
             <a:endParaRPr lang="en-US" altLang="zh-CN" sz="2400" b="1" dirty="0">
               <a:solidFill>
                 <a:srgbClr val="FBDED3"/>
@@ -10179,7 +9900,7 @@
                 </a:solidFill>
                 <a:sym typeface="+mn-ea"/>
               </a:rPr>
-              <a:t>Priority:2 </a:t>
+              <a:t>Task: </a:t>
             </a:r>
             <a:endParaRPr lang="en-US" altLang="zh-CN" sz="2400" b="1" dirty="0">
               <a:solidFill>
@@ -10195,7 +9916,18 @@
                 </a:solidFill>
                 <a:sym typeface="+mn-ea"/>
               </a:rPr>
-              <a:t>Task: </a:t>
+              <a:t>1.Write code to determine which users turn it is </a:t>
+            </a:r>
+          </a:p>
+          <a:p>
+            <a:r>
+              <a:rPr lang="en-US" altLang="zh-CN" sz="2400" b="1" dirty="0">
+                <a:solidFill>
+                  <a:srgbClr val="FBDED3"/>
+                </a:solidFill>
+                <a:sym typeface="+mn-ea"/>
+              </a:rPr>
+              <a:t>2.Add functionality to display the prompt </a:t>
             </a:r>
             <a:endParaRPr lang="en-US" altLang="zh-CN" sz="2400" b="1" dirty="0">
               <a:solidFill>
@@ -10204,45 +9936,12 @@
             </a:endParaRPr>
           </a:p>
           <a:p>
-            <a:r>
-              <a:rPr lang="en-US" altLang="zh-CN" sz="2400" b="1" dirty="0">
-                <a:solidFill>
-                  <a:srgbClr val="FBDED3"/>
-                </a:solidFill>
-                <a:sym typeface="+mn-ea"/>
-              </a:rPr>
-              <a:t>1.Write code to determine which users turn it is </a:t>
-            </a:r>
-            <a:endParaRPr lang="en-US" altLang="zh-CN" sz="2400" b="1" dirty="0">
-              <a:solidFill>
-                <a:srgbClr val="FBDED3"/>
-              </a:solidFill>
-              <a:sym typeface="+mn-ea"/>
-            </a:endParaRPr>
-          </a:p>
-          <a:p>
-            <a:r>
-              <a:rPr lang="en-US" altLang="zh-CN" sz="2400" b="1" dirty="0">
-                <a:solidFill>
-                  <a:srgbClr val="FBDED3"/>
-                </a:solidFill>
-                <a:sym typeface="+mn-ea"/>
-              </a:rPr>
-              <a:t>2.Add functionality to display the prompt </a:t>
-            </a:r>
             <a:endParaRPr lang="en-US" altLang="zh-CN" sz="2400" b="1" dirty="0">
               <a:solidFill>
                 <a:srgbClr val="FBDED3"/>
               </a:solidFill>
             </a:endParaRPr>
           </a:p>
-          <a:p>
-            <a:endParaRPr lang="en-US" altLang="zh-CN" sz="2400" b="1" dirty="0">
-              <a:solidFill>
-                <a:srgbClr val="FBDED3"/>
-              </a:solidFill>
-            </a:endParaRPr>
-          </a:p>
         </p:txBody>
       </p:sp>
     </p:spTree>
@@ -10250,13 +9949,13 @@
   <p:clrMapOvr>
     <a:masterClrMapping/>
   </p:clrMapOvr>
-  <mc:AlternateContent xmlns:mc="http://schemas.openxmlformats.org/markup-compatibility/2006">
-    <mc:Choice xmlns:p14="http://schemas.microsoft.com/office/powerpoint/2010/main" Requires="p14">
+  <mc:AlternateContent xmlns:mc="http://schemas.openxmlformats.org/markup-compatibility/2006" xmlns:p14="http://schemas.microsoft.com/office/powerpoint/2010/main">
+    <mc:Choice Requires="p14">
       <p:transition spd="slow" p14:dur="1500">
         <p:random/>
       </p:transition>
     </mc:Choice>
-    <mc:Fallback>
+    <mc:Fallback xmlns="">
       <p:transition spd="slow">
         <p:random/>
       </p:transition>
@@ -10360,12 +10059,6 @@
               </a:rPr>
               <a:t>  </a:t>
             </a:r>
-            <a:endParaRPr lang="en-US" altLang="zh-CN">
-              <a:solidFill>
-                <a:srgbClr val="FBDED3"/>
-              </a:solidFill>
-              <a:latin typeface="Arial" panose="020B0604020202020204"/>
-            </a:endParaRPr>
           </a:p>
         </p:txBody>
       </p:sp>
@@ -10377,8 +10070,8 @@
         </p:nvSpPr>
         <p:spPr>
           <a:xfrm>
-            <a:off x="780415" y="729615"/>
-            <a:ext cx="7583170" cy="4523105"/>
+            <a:off x="308366" y="750163"/>
+            <a:ext cx="8846050" cy="2954655"/>
           </a:xfrm>
           <a:prstGeom prst="rect">
             <a:avLst/>
@@ -10392,15 +10085,24 @@
           <a:lstStyle/>
           <a:p>
             <a:r>
-              <a:rPr lang="en-US" altLang="zh-CN" sz="2400" b="1" dirty="0">
+              <a:rPr lang="en-US" altLang="zh-CN" b="1" dirty="0">
                 <a:solidFill>
                   <a:srgbClr val="FBDED3"/>
                 </a:solidFill>
                 <a:sym typeface="+mn-ea"/>
               </a:rPr>
-              <a:t>• As a user, I want to register to this platform by using an email, nickname and a password. </a:t>
-            </a:r>
-            <a:endParaRPr lang="en-US" altLang="zh-CN" sz="2400" b="1" dirty="0">
+              <a:t>• As a user, I want to register to this platform by using an email, nickname and a password. Priority:3															</a:t>
+            </a:r>
+            <a:r>
+              <a:rPr lang="en-US" altLang="zh-CN" b="1" dirty="0">
+                <a:solidFill>
+                  <a:srgbClr val="00B050"/>
+                </a:solidFill>
+                <a:sym typeface="+mn-ea"/>
+              </a:rPr>
+              <a:t>(Finished)</a:t>
+            </a:r>
+            <a:endParaRPr lang="en-US" altLang="zh-CN" b="1" dirty="0">
               <a:solidFill>
                 <a:srgbClr val="FBDED3"/>
               </a:solidFill>
@@ -10408,16 +10110,7 @@
             </a:endParaRPr>
           </a:p>
           <a:p>
-            <a:r>
-              <a:rPr lang="en-US" altLang="zh-CN" sz="2400" b="1" dirty="0">
-                <a:solidFill>
-                  <a:srgbClr val="FBDED3"/>
-                </a:solidFill>
-                <a:sym typeface="+mn-ea"/>
-              </a:rPr>
-              <a:t>Priority:3 </a:t>
-            </a:r>
-            <a:endParaRPr lang="en-US" altLang="zh-CN" sz="2400" b="1" dirty="0">
+            <a:endParaRPr lang="en-US" altLang="zh-CN" b="1" dirty="0">
               <a:solidFill>
                 <a:srgbClr val="FBDED3"/>
               </a:solidFill>
@@ -10426,7 +10119,7 @@
           </a:p>
           <a:p>
             <a:r>
-              <a:rPr lang="en-US" altLang="zh-CN" sz="2400" b="1" dirty="0">
+              <a:rPr lang="en-US" altLang="zh-CN" b="1" dirty="0">
                 <a:solidFill>
                   <a:srgbClr val="FBDED3"/>
                 </a:solidFill>
@@ -10434,16 +10127,10 @@
               </a:rPr>
               <a:t>Task: </a:t>
             </a:r>
-            <a:endParaRPr lang="en-US" altLang="zh-CN" sz="2400" b="1" dirty="0">
-              <a:solidFill>
-                <a:srgbClr val="FBDED3"/>
-              </a:solidFill>
-              <a:sym typeface="+mn-ea"/>
-            </a:endParaRPr>
-          </a:p>
-          <a:p>
-            <a:r>
-              <a:rPr lang="en-US" altLang="zh-CN" sz="2400" b="1" dirty="0">
+          </a:p>
+          <a:p>
+            <a:r>
+              <a:rPr lang="en-US" altLang="zh-CN" b="1" dirty="0">
                 <a:solidFill>
                   <a:srgbClr val="FBDED3"/>
                 </a:solidFill>
@@ -10451,16 +10138,10 @@
               </a:rPr>
               <a:t>1.Write code about basic register screen</a:t>
             </a:r>
-            <a:endParaRPr lang="en-US" altLang="zh-CN" sz="2400" b="1" dirty="0">
-              <a:solidFill>
-                <a:srgbClr val="FBDED3"/>
-              </a:solidFill>
-              <a:sym typeface="+mn-ea"/>
-            </a:endParaRPr>
-          </a:p>
-          <a:p>
-            <a:r>
-              <a:rPr lang="en-US" altLang="zh-CN" sz="2400" b="1" dirty="0">
+          </a:p>
+          <a:p>
+            <a:r>
+              <a:rPr lang="en-US" altLang="zh-CN" b="1" dirty="0">
                 <a:solidFill>
                   <a:srgbClr val="FBDED3"/>
                 </a:solidFill>
@@ -10468,16 +10149,10 @@
               </a:rPr>
               <a:t>2.Write code to implement the legality of user information (such as the format of E-mail, length of password).</a:t>
             </a:r>
-            <a:endParaRPr lang="en-US" altLang="zh-CN" sz="2400" b="1" dirty="0">
-              <a:solidFill>
-                <a:srgbClr val="FBDED3"/>
-              </a:solidFill>
-              <a:sym typeface="+mn-ea"/>
-            </a:endParaRPr>
-          </a:p>
-          <a:p>
-            <a:r>
-              <a:rPr lang="en-US" altLang="zh-CN" sz="2400" b="1" dirty="0">
+          </a:p>
+          <a:p>
+            <a:r>
+              <a:rPr lang="en-US" altLang="zh-CN" b="1" dirty="0">
                 <a:solidFill>
                   <a:srgbClr val="FBDED3"/>
                 </a:solidFill>
@@ -10485,16 +10160,10 @@
               </a:rPr>
               <a:t>3.Write code to implement the registration button and the cancel button</a:t>
             </a:r>
-            <a:endParaRPr lang="en-US" altLang="zh-CN" sz="2400" b="1" dirty="0">
-              <a:solidFill>
-                <a:srgbClr val="FBDED3"/>
-              </a:solidFill>
-              <a:sym typeface="+mn-ea"/>
-            </a:endParaRPr>
-          </a:p>
-          <a:p>
-            <a:r>
-              <a:rPr lang="en-US" altLang="zh-CN" sz="2400" b="1" dirty="0">
+          </a:p>
+          <a:p>
+            <a:r>
+              <a:rPr lang="en-US" altLang="zh-CN" b="1" dirty="0">
                 <a:solidFill>
                   <a:srgbClr val="FBDED3"/>
                 </a:solidFill>
@@ -10502,12 +10171,6 @@
               </a:rPr>
               <a:t>4.Write code to achieve a successful registration screen and return to the login screen button</a:t>
             </a:r>
-            <a:endParaRPr lang="en-US" altLang="zh-CN" sz="2400" b="1" dirty="0">
-              <a:solidFill>
-                <a:srgbClr val="FBDED3"/>
-              </a:solidFill>
-              <a:sym typeface="+mn-ea"/>
-            </a:endParaRPr>
           </a:p>
           <a:p>
             <a:endParaRPr lang="en-US" altLang="zh-CN" sz="2400" b="1" dirty="0">
@@ -10523,13 +10186,13 @@
   <p:clrMapOvr>
     <a:masterClrMapping/>
   </p:clrMapOvr>
-  <mc:AlternateContent xmlns:mc="http://schemas.openxmlformats.org/markup-compatibility/2006">
-    <mc:Choice xmlns:p14="http://schemas.microsoft.com/office/powerpoint/2010/main" Requires="p14">
+  <mc:AlternateContent xmlns:mc="http://schemas.openxmlformats.org/markup-compatibility/2006" xmlns:p14="http://schemas.microsoft.com/office/powerpoint/2010/main">
+    <mc:Choice Requires="p14">
       <p:transition spd="slow" p14:dur="1500">
         <p:random/>
       </p:transition>
     </mc:Choice>
-    <mc:Fallback>
+    <mc:Fallback xmlns="">
       <p:transition spd="slow">
         <p:random/>
       </p:transition>
@@ -10633,12 +10296,6 @@
               </a:rPr>
               <a:t>  </a:t>
             </a:r>
-            <a:endParaRPr lang="en-US" altLang="zh-CN">
-              <a:solidFill>
-                <a:srgbClr val="FBDED3"/>
-              </a:solidFill>
-              <a:latin typeface="Arial" panose="020B0604020202020204"/>
-            </a:endParaRPr>
           </a:p>
         </p:txBody>
       </p:sp>
@@ -10650,8 +10307,8 @@
         </p:nvSpPr>
         <p:spPr>
           <a:xfrm>
-            <a:off x="626110" y="619760"/>
-            <a:ext cx="8319135" cy="4799965"/>
+            <a:off x="82194" y="619760"/>
+            <a:ext cx="9061806" cy="4799965"/>
           </a:xfrm>
           <a:prstGeom prst="rect">
             <a:avLst/>
@@ -10673,6 +10330,28 @@
               </a:rPr>
               <a:t>• As a user, I want to login to this platform using the account I registered. </a:t>
             </a:r>
+            <a:r>
+              <a:rPr lang="en-US" altLang="zh-CN" b="1" dirty="0">
+                <a:solidFill>
+                  <a:srgbClr val="00B050"/>
+                </a:solidFill>
+                <a:sym typeface="+mn-ea"/>
+              </a:rPr>
+              <a:t>(Finished)</a:t>
+            </a:r>
+          </a:p>
+          <a:p>
+            <a:r>
+              <a:rPr lang="en-US" altLang="zh-CN" b="1" dirty="0">
+                <a:solidFill>
+                  <a:srgbClr val="FBDED3"/>
+                </a:solidFill>
+                <a:sym typeface="+mn-ea"/>
+              </a:rPr>
+              <a:t>Priority:4 </a:t>
+            </a:r>
+          </a:p>
+          <a:p>
             <a:endParaRPr lang="en-US" altLang="zh-CN" b="1" dirty="0">
               <a:solidFill>
                 <a:srgbClr val="FBDED3"/>
@@ -10688,8 +10367,43 @@
                 </a:solidFill>
                 <a:sym typeface="+mn-ea"/>
               </a:rPr>
-              <a:t>Priority:4 </a:t>
-            </a:r>
+              <a:t>Task: </a:t>
+            </a:r>
+          </a:p>
+          <a:p>
+            <a:r>
+              <a:rPr lang="en-US" altLang="zh-CN" b="1" dirty="0">
+                <a:solidFill>
+                  <a:srgbClr val="FBDED3"/>
+                </a:solidFill>
+                <a:sym typeface="+mn-ea"/>
+              </a:rPr>
+              <a:t>1.Write code to implement basic Login screen</a:t>
+            </a:r>
+          </a:p>
+          <a:p>
+            <a:r>
+              <a:rPr lang="en-US" altLang="zh-CN" b="1" dirty="0">
+                <a:solidFill>
+                  <a:srgbClr val="FBDED3"/>
+                </a:solidFill>
+                <a:sym typeface="+mn-ea"/>
+              </a:rPr>
+              <a:t>2.Write code to implement the legality of user information (such as the format of E-mail, length of password).</a:t>
+            </a:r>
+          </a:p>
+          <a:p>
+            <a:r>
+              <a:rPr lang="en-US" altLang="zh-CN" b="1" dirty="0">
+                <a:solidFill>
+                  <a:srgbClr val="FBDED3"/>
+                </a:solidFill>
+                <a:sym typeface="+mn-ea"/>
+              </a:rPr>
+              <a:t>3.Write code to implement the login button and the registration button</a:t>
+            </a:r>
+          </a:p>
+          <a:p>
             <a:endParaRPr lang="en-US" altLang="zh-CN" b="1" dirty="0">
               <a:solidFill>
                 <a:srgbClr val="FBDED3"/>
@@ -10698,6 +10412,81 @@
             </a:endParaRPr>
           </a:p>
           <a:p>
+            <a:r>
+              <a:rPr lang="en-US" altLang="zh-CN" b="1" dirty="0">
+                <a:solidFill>
+                  <a:srgbClr val="FBDED3"/>
+                </a:solidFill>
+                <a:sym typeface="+mn-ea"/>
+              </a:rPr>
+              <a:t>• As a user, I want to be able to logout from my account when I do not want to play, and receive a prompt before it exits.  </a:t>
+            </a:r>
+            <a:r>
+              <a:rPr lang="en-US" altLang="zh-CN" b="1" dirty="0">
+                <a:solidFill>
+                  <a:srgbClr val="00B050"/>
+                </a:solidFill>
+                <a:sym typeface="+mn-ea"/>
+              </a:rPr>
+              <a:t>(Finished)</a:t>
+            </a:r>
+          </a:p>
+          <a:p>
+            <a:r>
+              <a:rPr lang="en-US" altLang="zh-CN" b="1" dirty="0">
+                <a:solidFill>
+                  <a:srgbClr val="FBDED3"/>
+                </a:solidFill>
+                <a:sym typeface="+mn-ea"/>
+              </a:rPr>
+              <a:t>Priority:5 </a:t>
+            </a:r>
+          </a:p>
+          <a:p>
+            <a:r>
+              <a:rPr lang="en-US" altLang="zh-CN" b="1" dirty="0">
+                <a:solidFill>
+                  <a:srgbClr val="FBDED3"/>
+                </a:solidFill>
+                <a:sym typeface="+mn-ea"/>
+              </a:rPr>
+              <a:t>Task: </a:t>
+            </a:r>
+          </a:p>
+          <a:p>
+            <a:r>
+              <a:rPr lang="en-US" altLang="zh-CN" b="1" dirty="0">
+                <a:solidFill>
+                  <a:srgbClr val="FBDED3"/>
+                </a:solidFill>
+                <a:sym typeface="+mn-ea"/>
+              </a:rPr>
+              <a:t>1.Write code to logout prompt screen</a:t>
+            </a:r>
+          </a:p>
+          <a:p>
+            <a:r>
+              <a:rPr lang="en-US" altLang="zh-CN" b="1" dirty="0">
+                <a:solidFill>
+                  <a:srgbClr val="FBDED3"/>
+                </a:solidFill>
+                <a:sym typeface="+mn-ea"/>
+              </a:rPr>
+              <a:t>2.Write code to implement the logout button and the return button</a:t>
+            </a:r>
+          </a:p>
+          <a:p>
+            <a:r>
+              <a:rPr lang="en-US" altLang="zh-CN" b="1" dirty="0">
+                <a:solidFill>
+                  <a:srgbClr val="FBDED3"/>
+                </a:solidFill>
+                <a:sym typeface="+mn-ea"/>
+              </a:rPr>
+              <a:t>3.Write code to jump back to the login screen</a:t>
+            </a:r>
+          </a:p>
+          <a:p>
             <a:endParaRPr lang="en-US" altLang="zh-CN" b="1" dirty="0">
               <a:solidFill>
                 <a:srgbClr val="FBDED3"/>
@@ -10705,192 +10494,6 @@
               <a:sym typeface="+mn-ea"/>
             </a:endParaRPr>
           </a:p>
-          <a:p>
-            <a:r>
-              <a:rPr lang="en-US" altLang="zh-CN" b="1" dirty="0">
-                <a:solidFill>
-                  <a:srgbClr val="FBDED3"/>
-                </a:solidFill>
-                <a:sym typeface="+mn-ea"/>
-              </a:rPr>
-              <a:t>Task: </a:t>
-            </a:r>
-            <a:endParaRPr lang="en-US" altLang="zh-CN" b="1" dirty="0">
-              <a:solidFill>
-                <a:srgbClr val="FBDED3"/>
-              </a:solidFill>
-              <a:sym typeface="+mn-ea"/>
-            </a:endParaRPr>
-          </a:p>
-          <a:p>
-            <a:r>
-              <a:rPr lang="en-US" altLang="zh-CN" b="1" dirty="0">
-                <a:solidFill>
-                  <a:srgbClr val="FBDED3"/>
-                </a:solidFill>
-                <a:sym typeface="+mn-ea"/>
-              </a:rPr>
-              <a:t>1.Write code to implement basic Login screen</a:t>
-            </a:r>
-            <a:endParaRPr lang="en-US" altLang="zh-CN" b="1" dirty="0">
-              <a:solidFill>
-                <a:srgbClr val="FBDED3"/>
-              </a:solidFill>
-              <a:sym typeface="+mn-ea"/>
-            </a:endParaRPr>
-          </a:p>
-          <a:p>
-            <a:r>
-              <a:rPr lang="en-US" altLang="zh-CN" b="1" dirty="0">
-                <a:solidFill>
-                  <a:srgbClr val="FBDED3"/>
-                </a:solidFill>
-                <a:sym typeface="+mn-ea"/>
-              </a:rPr>
-              <a:t>2.Write code to implement the legality of user information (such as the format of E-mail, length of password).</a:t>
-            </a:r>
-            <a:endParaRPr lang="en-US" altLang="zh-CN" b="1" dirty="0">
-              <a:solidFill>
-                <a:srgbClr val="FBDED3"/>
-              </a:solidFill>
-              <a:sym typeface="+mn-ea"/>
-            </a:endParaRPr>
-          </a:p>
-          <a:p>
-            <a:r>
-              <a:rPr lang="en-US" altLang="zh-CN" b="1" dirty="0">
-                <a:solidFill>
-                  <a:srgbClr val="FBDED3"/>
-                </a:solidFill>
-                <a:sym typeface="+mn-ea"/>
-              </a:rPr>
-              <a:t>3.Write code to implement the login button and the registration button</a:t>
-            </a:r>
-            <a:endParaRPr lang="en-US" altLang="zh-CN" b="1" dirty="0">
-              <a:solidFill>
-                <a:srgbClr val="FBDED3"/>
-              </a:solidFill>
-              <a:sym typeface="+mn-ea"/>
-            </a:endParaRPr>
-          </a:p>
-          <a:p>
-            <a:endParaRPr lang="en-US" altLang="zh-CN" b="1" dirty="0">
-              <a:solidFill>
-                <a:srgbClr val="FBDED3"/>
-              </a:solidFill>
-              <a:sym typeface="+mn-ea"/>
-            </a:endParaRPr>
-          </a:p>
-          <a:p>
-            <a:r>
-              <a:rPr lang="en-US" altLang="zh-CN" b="1" dirty="0">
-                <a:solidFill>
-                  <a:srgbClr val="FBDED3"/>
-                </a:solidFill>
-                <a:sym typeface="+mn-ea"/>
-              </a:rPr>
-              <a:t>• As a user, I want to be able to logout from my account when I do not want to play, and receive a prompt before it exits. </a:t>
-            </a:r>
-            <a:endParaRPr lang="en-US" altLang="zh-CN" b="1" dirty="0">
-              <a:solidFill>
-                <a:srgbClr val="FBDED3"/>
-              </a:solidFill>
-              <a:sym typeface="+mn-ea"/>
-            </a:endParaRPr>
-          </a:p>
-          <a:p>
-            <a:r>
-              <a:rPr lang="en-US" altLang="zh-CN" b="1" dirty="0">
-                <a:solidFill>
-                  <a:srgbClr val="FBDED3"/>
-                </a:solidFill>
-                <a:sym typeface="+mn-ea"/>
-              </a:rPr>
-              <a:t>Priority:5 </a:t>
-            </a:r>
-            <a:endParaRPr lang="en-US" altLang="zh-CN" b="1" dirty="0">
-              <a:solidFill>
-                <a:srgbClr val="FBDED3"/>
-              </a:solidFill>
-              <a:sym typeface="+mn-ea"/>
-            </a:endParaRPr>
-          </a:p>
-          <a:p>
-            <a:r>
-              <a:rPr lang="en-US" altLang="zh-CN" b="1" dirty="0">
-                <a:solidFill>
-                  <a:srgbClr val="FBDED3"/>
-                </a:solidFill>
-                <a:sym typeface="+mn-ea"/>
-              </a:rPr>
-              <a:t>Task: </a:t>
-            </a:r>
-            <a:endParaRPr lang="en-US" altLang="zh-CN" b="1" dirty="0">
-              <a:solidFill>
-                <a:srgbClr val="FBDED3"/>
-              </a:solidFill>
-              <a:sym typeface="+mn-ea"/>
-            </a:endParaRPr>
-          </a:p>
-          <a:p>
-            <a:r>
-              <a:rPr lang="en-US" altLang="zh-CN" b="1" dirty="0">
-                <a:solidFill>
-                  <a:srgbClr val="FBDED3"/>
-                </a:solidFill>
-                <a:sym typeface="+mn-ea"/>
-              </a:rPr>
-              <a:t>1.Write code to logout prompt screen</a:t>
-            </a:r>
-            <a:endParaRPr lang="en-US" altLang="zh-CN" b="1" dirty="0">
-              <a:solidFill>
-                <a:srgbClr val="FBDED3"/>
-              </a:solidFill>
-              <a:sym typeface="+mn-ea"/>
-            </a:endParaRPr>
-          </a:p>
-          <a:p>
-            <a:r>
-              <a:rPr lang="en-US" altLang="zh-CN" b="1" dirty="0">
-                <a:solidFill>
-                  <a:srgbClr val="FBDED3"/>
-                </a:solidFill>
-                <a:sym typeface="+mn-ea"/>
-              </a:rPr>
-              <a:t>2.Write code to implement the logout button and the return button</a:t>
-            </a:r>
-            <a:endParaRPr lang="en-US" altLang="zh-CN" b="1" dirty="0">
-              <a:solidFill>
-                <a:srgbClr val="FBDED3"/>
-              </a:solidFill>
-              <a:sym typeface="+mn-ea"/>
-            </a:endParaRPr>
-          </a:p>
-          <a:p>
-            <a:r>
-              <a:rPr lang="en-US" altLang="zh-CN" b="1" dirty="0">
-                <a:solidFill>
-                  <a:srgbClr val="FBDED3"/>
-                </a:solidFill>
-                <a:sym typeface="+mn-ea"/>
-              </a:rPr>
-              <a:t>3.Write code to jump back to the login screen</a:t>
-            </a:r>
-            <a:endParaRPr lang="en-US" altLang="zh-CN" b="1" dirty="0">
-              <a:solidFill>
-                <a:srgbClr val="FBDED3"/>
-              </a:solidFill>
-              <a:sym typeface="+mn-ea"/>
-            </a:endParaRPr>
-          </a:p>
-          <a:p>
-            <a:endParaRPr lang="en-US" altLang="zh-CN" b="1" dirty="0">
-              <a:solidFill>
-                <a:srgbClr val="FBDED3"/>
-              </a:solidFill>
-              <a:sym typeface="+mn-ea"/>
-            </a:endParaRPr>
-          </a:p>
         </p:txBody>
       </p:sp>
     </p:spTree>
@@ -10898,13 +10501,13 @@
   <p:clrMapOvr>
     <a:masterClrMapping/>
   </p:clrMapOvr>
-  <mc:AlternateContent xmlns:mc="http://schemas.openxmlformats.org/markup-compatibility/2006">
-    <mc:Choice xmlns:p14="http://schemas.microsoft.com/office/powerpoint/2010/main" Requires="p14">
+  <mc:AlternateContent xmlns:mc="http://schemas.openxmlformats.org/markup-compatibility/2006" xmlns:p14="http://schemas.microsoft.com/office/powerpoint/2010/main">
+    <mc:Choice Requires="p14">
       <p:transition spd="slow" p14:dur="1500">
         <p:random/>
       </p:transition>
     </mc:Choice>
-    <mc:Fallback>
+    <mc:Fallback xmlns="">
       <p:transition spd="slow">
         <p:random/>
       </p:transition>
@@ -11104,6 +10707,8 @@
       </a:bgFillStyleLst>
     </a:fmtScheme>
   </a:themeElements>
+  <a:objectDefaults/>
+  <a:extraClrSchemeLst/>
   <a:extLst>
     <a:ext uri="{05A4C25C-085E-4340-85A3-A5531E510DB2}">
       <thm15:themeFamily xmlns:thm15="http://schemas.microsoft.com/office/thememl/2012/main" name="Office Theme" id="{62F939B6-93AF-4DB8-9C6B-D6C7DFDC589F}" vid="{4A3C46E8-61CC-4603-A589-7422A47A8E4A}"/>
@@ -11303,6 +10908,8 @@
       </a:bgFillStyleLst>
     </a:fmtScheme>
   </a:themeElements>
+  <a:objectDefaults/>
+  <a:extraClrSchemeLst/>
   <a:extLst>
     <a:ext uri="{05A4C25C-085E-4340-85A3-A5531E510DB2}">
       <thm15:themeFamily xmlns:thm15="http://schemas.microsoft.com/office/thememl/2012/main" name="Office Theme" id="{62F939B6-93AF-4DB8-9C6B-D6C7DFDC589F}" vid="{4A3C46E8-61CC-4603-A589-7422A47A8E4A}"/>
@@ -11562,6 +11169,8 @@
       </a:bgFillStyleLst>
     </a:fmtScheme>
   </a:themeElements>
+  <a:objectDefaults/>
+  <a:extraClrSchemeLst/>
   <a:extLst>
     <a:ext uri="{05A4C25C-085E-4340-85A3-A5531E510DB2}">
       <thm15:themeFamily xmlns:thm15="http://schemas.microsoft.com/office/thememl/2012/main" name="Office Theme" id="{62F939B6-93AF-4DB8-9C6B-D6C7DFDC589F}" vid="{4A3C46E8-61CC-4603-A589-7422A47A8E4A}"/>

</xml_diff>